<commit_message>
Added Video Into Presentation
</commit_message>
<xml_diff>
--- a/Group/Presentations/Pitch #2 (New).pptx
+++ b/Group/Presentations/Pitch #2 (New).pptx
@@ -118,7 +118,7 @@
   </p:defaultTextStyle>
   <p:extLst>
     <p:ext uri="{EFAFB233-063F-42B5-8137-9DF3F51BA10A}">
-      <p15:sldGuideLst xmlns="" xmlns:p15="http://schemas.microsoft.com/office/powerpoint/2012/main"/>
+      <p15:sldGuideLst xmlns:p15="http://schemas.microsoft.com/office/powerpoint/2012/main" xmlns=""/>
     </p:ext>
   </p:extLst>
 </p:presentation>
@@ -380,7 +380,7 @@
     </p:spTree>
     <p:extLst>
       <p:ext uri="{BB962C8B-B14F-4D97-AF65-F5344CB8AC3E}">
-        <p14:creationId xmlns="" xmlns:p14="http://schemas.microsoft.com/office/powerpoint/2010/main" val="2712662513"/>
+        <p14:creationId xmlns:p14="http://schemas.microsoft.com/office/powerpoint/2010/main" xmlns="" val="2712662513"/>
       </p:ext>
     </p:extLst>
   </p:cSld>
@@ -555,7 +555,7 @@
     </p:spTree>
     <p:extLst>
       <p:ext uri="{BB962C8B-B14F-4D97-AF65-F5344CB8AC3E}">
-        <p14:creationId xmlns="" xmlns:p14="http://schemas.microsoft.com/office/powerpoint/2010/main" val="344233343"/>
+        <p14:creationId xmlns:p14="http://schemas.microsoft.com/office/powerpoint/2010/main" xmlns="" val="344233343"/>
       </p:ext>
     </p:extLst>
   </p:cSld>
@@ -711,7 +711,7 @@
     </p:spTree>
     <p:extLst>
       <p:ext uri="{BB962C8B-B14F-4D97-AF65-F5344CB8AC3E}">
-        <p14:creationId xmlns="" xmlns:p14="http://schemas.microsoft.com/office/powerpoint/2010/main" val="843437973"/>
+        <p14:creationId xmlns:p14="http://schemas.microsoft.com/office/powerpoint/2010/main" xmlns="" val="843437973"/>
       </p:ext>
     </p:extLst>
   </p:cSld>
@@ -970,7 +970,7 @@
     </p:spTree>
     <p:extLst>
       <p:ext uri="{BB962C8B-B14F-4D97-AF65-F5344CB8AC3E}">
-        <p14:creationId xmlns="" xmlns:p14="http://schemas.microsoft.com/office/powerpoint/2010/main" val="1137906455"/>
+        <p14:creationId xmlns:p14="http://schemas.microsoft.com/office/powerpoint/2010/main" xmlns="" val="1137906455"/>
       </p:ext>
     </p:extLst>
   </p:cSld>
@@ -1253,7 +1253,7 @@
     </p:spTree>
     <p:extLst>
       <p:ext uri="{BB962C8B-B14F-4D97-AF65-F5344CB8AC3E}">
-        <p14:creationId xmlns="" xmlns:p14="http://schemas.microsoft.com/office/powerpoint/2010/main" val="1051877521"/>
+        <p14:creationId xmlns:p14="http://schemas.microsoft.com/office/powerpoint/2010/main" xmlns="" val="1051877521"/>
       </p:ext>
     </p:extLst>
   </p:cSld>
@@ -1447,7 +1447,7 @@
     </p:spTree>
     <p:extLst>
       <p:ext uri="{BB962C8B-B14F-4D97-AF65-F5344CB8AC3E}">
-        <p14:creationId xmlns="" xmlns:p14="http://schemas.microsoft.com/office/powerpoint/2010/main" val="2305167636"/>
+        <p14:creationId xmlns:p14="http://schemas.microsoft.com/office/powerpoint/2010/main" xmlns="" val="2305167636"/>
       </p:ext>
     </p:extLst>
   </p:cSld>
@@ -1942,7 +1942,7 @@
     </p:spTree>
     <p:extLst>
       <p:ext uri="{BB962C8B-B14F-4D97-AF65-F5344CB8AC3E}">
-        <p14:creationId xmlns="" xmlns:p14="http://schemas.microsoft.com/office/powerpoint/2010/main" val="3536611326"/>
+        <p14:creationId xmlns:p14="http://schemas.microsoft.com/office/powerpoint/2010/main" xmlns="" val="3536611326"/>
       </p:ext>
     </p:extLst>
   </p:cSld>
@@ -2138,7 +2138,7 @@
     </p:spTree>
     <p:extLst>
       <p:ext uri="{BB962C8B-B14F-4D97-AF65-F5344CB8AC3E}">
-        <p14:creationId xmlns="" xmlns:p14="http://schemas.microsoft.com/office/powerpoint/2010/main" val="3538037079"/>
+        <p14:creationId xmlns:p14="http://schemas.microsoft.com/office/powerpoint/2010/main" xmlns="" val="3538037079"/>
       </p:ext>
     </p:extLst>
   </p:cSld>
@@ -2686,7 +2686,7 @@
     </p:spTree>
     <p:extLst>
       <p:ext uri="{BB962C8B-B14F-4D97-AF65-F5344CB8AC3E}">
-        <p14:creationId xmlns="" xmlns:p14="http://schemas.microsoft.com/office/powerpoint/2010/main" val="2905165778"/>
+        <p14:creationId xmlns:p14="http://schemas.microsoft.com/office/powerpoint/2010/main" xmlns="" val="2905165778"/>
       </p:ext>
     </p:extLst>
   </p:cSld>
@@ -3519,7 +3519,7 @@
     </p:spTree>
     <p:extLst>
       <p:ext uri="{BB962C8B-B14F-4D97-AF65-F5344CB8AC3E}">
-        <p14:creationId xmlns="" xmlns:p14="http://schemas.microsoft.com/office/powerpoint/2010/main" val="3712731"/>
+        <p14:creationId xmlns:p14="http://schemas.microsoft.com/office/powerpoint/2010/main" xmlns="" val="3712731"/>
       </p:ext>
     </p:extLst>
   </p:cSld>
@@ -3691,7 +3691,7 @@
     </p:spTree>
     <p:extLst>
       <p:ext uri="{BB962C8B-B14F-4D97-AF65-F5344CB8AC3E}">
-        <p14:creationId xmlns="" xmlns:p14="http://schemas.microsoft.com/office/powerpoint/2010/main" val="3951405928"/>
+        <p14:creationId xmlns:p14="http://schemas.microsoft.com/office/powerpoint/2010/main" xmlns="" val="3951405928"/>
       </p:ext>
     </p:extLst>
   </p:cSld>
@@ -3873,7 +3873,7 @@
     </p:spTree>
     <p:extLst>
       <p:ext uri="{BB962C8B-B14F-4D97-AF65-F5344CB8AC3E}">
-        <p14:creationId xmlns="" xmlns:p14="http://schemas.microsoft.com/office/powerpoint/2010/main" val="2572431118"/>
+        <p14:creationId xmlns:p14="http://schemas.microsoft.com/office/powerpoint/2010/main" xmlns="" val="2572431118"/>
       </p:ext>
     </p:extLst>
   </p:cSld>
@@ -4045,7 +4045,7 @@
     </p:spTree>
     <p:extLst>
       <p:ext uri="{BB962C8B-B14F-4D97-AF65-F5344CB8AC3E}">
-        <p14:creationId xmlns="" xmlns:p14="http://schemas.microsoft.com/office/powerpoint/2010/main" val="3190397485"/>
+        <p14:creationId xmlns:p14="http://schemas.microsoft.com/office/powerpoint/2010/main" xmlns="" val="3190397485"/>
       </p:ext>
     </p:extLst>
   </p:cSld>
@@ -4304,7 +4304,7 @@
     </p:spTree>
     <p:extLst>
       <p:ext uri="{BB962C8B-B14F-4D97-AF65-F5344CB8AC3E}">
-        <p14:creationId xmlns="" xmlns:p14="http://schemas.microsoft.com/office/powerpoint/2010/main" val="1907339060"/>
+        <p14:creationId xmlns:p14="http://schemas.microsoft.com/office/powerpoint/2010/main" xmlns="" val="1907339060"/>
       </p:ext>
     </p:extLst>
   </p:cSld>
@@ -4538,7 +4538,7 @@
     </p:spTree>
     <p:extLst>
       <p:ext uri="{BB962C8B-B14F-4D97-AF65-F5344CB8AC3E}">
-        <p14:creationId xmlns="" xmlns:p14="http://schemas.microsoft.com/office/powerpoint/2010/main" val="3589843527"/>
+        <p14:creationId xmlns:p14="http://schemas.microsoft.com/office/powerpoint/2010/main" xmlns="" val="3589843527"/>
       </p:ext>
     </p:extLst>
   </p:cSld>
@@ -4933,7 +4933,7 @@
     </p:spTree>
     <p:extLst>
       <p:ext uri="{BB962C8B-B14F-4D97-AF65-F5344CB8AC3E}">
-        <p14:creationId xmlns="" xmlns:p14="http://schemas.microsoft.com/office/powerpoint/2010/main" val="1348156944"/>
+        <p14:creationId xmlns:p14="http://schemas.microsoft.com/office/powerpoint/2010/main" xmlns="" val="1348156944"/>
       </p:ext>
     </p:extLst>
   </p:cSld>
@@ -5053,7 +5053,7 @@
     </p:spTree>
     <p:extLst>
       <p:ext uri="{BB962C8B-B14F-4D97-AF65-F5344CB8AC3E}">
-        <p14:creationId xmlns="" xmlns:p14="http://schemas.microsoft.com/office/powerpoint/2010/main" val="7440479"/>
+        <p14:creationId xmlns:p14="http://schemas.microsoft.com/office/powerpoint/2010/main" xmlns="" val="7440479"/>
       </p:ext>
     </p:extLst>
   </p:cSld>
@@ -5150,7 +5150,7 @@
     </p:spTree>
     <p:extLst>
       <p:ext uri="{BB962C8B-B14F-4D97-AF65-F5344CB8AC3E}">
-        <p14:creationId xmlns="" xmlns:p14="http://schemas.microsoft.com/office/powerpoint/2010/main" val="4287353945"/>
+        <p14:creationId xmlns:p14="http://schemas.microsoft.com/office/powerpoint/2010/main" xmlns="" val="4287353945"/>
       </p:ext>
     </p:extLst>
   </p:cSld>
@@ -5425,7 +5425,7 @@
     </p:spTree>
     <p:extLst>
       <p:ext uri="{BB962C8B-B14F-4D97-AF65-F5344CB8AC3E}">
-        <p14:creationId xmlns="" xmlns:p14="http://schemas.microsoft.com/office/powerpoint/2010/main" val="3320250197"/>
+        <p14:creationId xmlns:p14="http://schemas.microsoft.com/office/powerpoint/2010/main" xmlns="" val="3320250197"/>
       </p:ext>
     </p:extLst>
   </p:cSld>
@@ -5708,7 +5708,7 @@
     </p:spTree>
     <p:extLst>
       <p:ext uri="{BB962C8B-B14F-4D97-AF65-F5344CB8AC3E}">
-        <p14:creationId xmlns="" xmlns:p14="http://schemas.microsoft.com/office/powerpoint/2010/main" val="1022564394"/>
+        <p14:creationId xmlns:p14="http://schemas.microsoft.com/office/powerpoint/2010/main" xmlns="" val="1022564394"/>
       </p:ext>
     </p:extLst>
   </p:cSld>
@@ -6022,7 +6022,7 @@
     </p:spTree>
     <p:extLst>
       <p:ext uri="{BB962C8B-B14F-4D97-AF65-F5344CB8AC3E}">
-        <p14:creationId xmlns="" xmlns:p14="http://schemas.microsoft.com/office/powerpoint/2010/main" val="3301980907"/>
+        <p14:creationId xmlns:p14="http://schemas.microsoft.com/office/powerpoint/2010/main" xmlns="" val="3301980907"/>
       </p:ext>
     </p:extLst>
   </p:cSld>
@@ -6466,7 +6466,7 @@
           <p:cNvPr id="3" name="Subtitle 2">
             <a:extLst>
               <a:ext uri="{FF2B5EF4-FFF2-40B4-BE49-F238E27FC236}">
-                <a16:creationId xmlns="" xmlns:a16="http://schemas.microsoft.com/office/drawing/2014/main" id="{5ABA27A7-F554-431F-AC36-677718D18D0D}"/>
+                <a16:creationId xmlns:a16="http://schemas.microsoft.com/office/drawing/2014/main" xmlns="" id="{5ABA27A7-F554-431F-AC36-677718D18D0D}"/>
               </a:ext>
             </a:extLst>
           </p:cNvPr>
@@ -6494,7 +6494,7 @@
           <p:cNvPr id="5" name="Picture 4">
             <a:extLst>
               <a:ext uri="{FF2B5EF4-FFF2-40B4-BE49-F238E27FC236}">
-                <a16:creationId xmlns="" xmlns:a16="http://schemas.microsoft.com/office/drawing/2014/main" id="{56BC570F-275E-4863-875C-196A7F70F273}"/>
+                <a16:creationId xmlns:a16="http://schemas.microsoft.com/office/drawing/2014/main" xmlns="" id="{56BC570F-275E-4863-875C-196A7F70F273}"/>
               </a:ext>
             </a:extLst>
           </p:cNvPr>
@@ -6507,7 +6507,7 @@
           <a:blip r:embed="rId2" cstate="print">
             <a:extLst>
               <a:ext uri="{28A0092B-C50C-407E-A947-70E740481C1C}">
-                <a14:useLocalDpi xmlns="" xmlns:a14="http://schemas.microsoft.com/office/drawing/2010/main" val="0"/>
+                <a14:useLocalDpi xmlns:a14="http://schemas.microsoft.com/office/drawing/2010/main" xmlns="" val="0"/>
               </a:ext>
             </a:extLst>
           </a:blip>
@@ -6530,7 +6530,7 @@
           <p:cNvPr id="6" name="Picture 5">
             <a:extLst>
               <a:ext uri="{FF2B5EF4-FFF2-40B4-BE49-F238E27FC236}">
-                <a16:creationId xmlns="" xmlns:a16="http://schemas.microsoft.com/office/drawing/2014/main" id="{96337E55-D478-4700-95FE-838A61730040}"/>
+                <a16:creationId xmlns:a16="http://schemas.microsoft.com/office/drawing/2014/main" xmlns="" id="{96337E55-D478-4700-95FE-838A61730040}"/>
               </a:ext>
             </a:extLst>
           </p:cNvPr>
@@ -6543,7 +6543,7 @@
           <a:blip r:embed="rId3" cstate="print">
             <a:extLst>
               <a:ext uri="{28A0092B-C50C-407E-A947-70E740481C1C}">
-                <a14:useLocalDpi xmlns="" xmlns:a14="http://schemas.microsoft.com/office/drawing/2010/main" val="0"/>
+                <a14:useLocalDpi xmlns:a14="http://schemas.microsoft.com/office/drawing/2010/main" xmlns="" val="0"/>
               </a:ext>
             </a:extLst>
           </a:blip>
@@ -6564,7 +6564,7 @@
     </p:spTree>
     <p:extLst>
       <p:ext uri="{BB962C8B-B14F-4D97-AF65-F5344CB8AC3E}">
-        <p14:creationId xmlns="" xmlns:p14="http://schemas.microsoft.com/office/powerpoint/2010/main" val="635248824"/>
+        <p14:creationId xmlns:p14="http://schemas.microsoft.com/office/powerpoint/2010/main" xmlns="" val="635248824"/>
       </p:ext>
     </p:extLst>
   </p:cSld>
@@ -6603,7 +6603,7 @@
           <p:cNvPr id="2" name="Title 1">
             <a:extLst>
               <a:ext uri="{FF2B5EF4-FFF2-40B4-BE49-F238E27FC236}">
-                <a16:creationId xmlns="" xmlns:a16="http://schemas.microsoft.com/office/drawing/2014/main" id="{FE1707A6-BD99-4ECF-BCE4-A1519B020B36}"/>
+                <a16:creationId xmlns:a16="http://schemas.microsoft.com/office/drawing/2014/main" xmlns="" id="{FE1707A6-BD99-4ECF-BCE4-A1519B020B36}"/>
               </a:ext>
             </a:extLst>
           </p:cNvPr>
@@ -6637,7 +6637,7 @@
           <p:cNvPr id="5" name="Picture 4">
             <a:extLst>
               <a:ext uri="{FF2B5EF4-FFF2-40B4-BE49-F238E27FC236}">
-                <a16:creationId xmlns="" xmlns:a16="http://schemas.microsoft.com/office/drawing/2014/main" id="{55ED534F-A991-4E89-BFA6-62449C870B20}"/>
+                <a16:creationId xmlns:a16="http://schemas.microsoft.com/office/drawing/2014/main" xmlns="" id="{55ED534F-A991-4E89-BFA6-62449C870B20}"/>
               </a:ext>
             </a:extLst>
           </p:cNvPr>
@@ -6650,7 +6650,7 @@
           <a:blip r:embed="rId2" cstate="print">
             <a:extLst>
               <a:ext uri="{28A0092B-C50C-407E-A947-70E740481C1C}">
-                <a14:useLocalDpi xmlns="" xmlns:a14="http://schemas.microsoft.com/office/drawing/2010/main" val="0"/>
+                <a14:useLocalDpi xmlns:a14="http://schemas.microsoft.com/office/drawing/2010/main" xmlns="" val="0"/>
               </a:ext>
             </a:extLst>
           </a:blip>
@@ -6673,7 +6673,7 @@
           <p:cNvPr id="7" name="Picture 6">
             <a:extLst>
               <a:ext uri="{FF2B5EF4-FFF2-40B4-BE49-F238E27FC236}">
-                <a16:creationId xmlns="" xmlns:a16="http://schemas.microsoft.com/office/drawing/2014/main" id="{BBB2C33A-3D86-494C-831C-49E185BA475E}"/>
+                <a16:creationId xmlns:a16="http://schemas.microsoft.com/office/drawing/2014/main" xmlns="" id="{BBB2C33A-3D86-494C-831C-49E185BA475E}"/>
               </a:ext>
             </a:extLst>
           </p:cNvPr>
@@ -6686,7 +6686,7 @@
           <a:blip r:embed="rId3" cstate="print">
             <a:extLst>
               <a:ext uri="{28A0092B-C50C-407E-A947-70E740481C1C}">
-                <a14:useLocalDpi xmlns="" xmlns:a14="http://schemas.microsoft.com/office/drawing/2010/main" val="0"/>
+                <a14:useLocalDpi xmlns:a14="http://schemas.microsoft.com/office/drawing/2010/main" xmlns="" val="0"/>
               </a:ext>
             </a:extLst>
           </a:blip>
@@ -6709,7 +6709,7 @@
           <p:cNvPr id="8" name="TextBox 7">
             <a:extLst>
               <a:ext uri="{FF2B5EF4-FFF2-40B4-BE49-F238E27FC236}">
-                <a16:creationId xmlns="" xmlns:a16="http://schemas.microsoft.com/office/drawing/2014/main" id="{046F16AB-849B-4477-A6EB-C6E5431CA61C}"/>
+                <a16:creationId xmlns:a16="http://schemas.microsoft.com/office/drawing/2014/main" xmlns="" id="{046F16AB-849B-4477-A6EB-C6E5431CA61C}"/>
               </a:ext>
             </a:extLst>
           </p:cNvPr>
@@ -6760,7 +6760,7 @@
           <p:cNvPr id="10" name="Picture 9">
             <a:extLst>
               <a:ext uri="{FF2B5EF4-FFF2-40B4-BE49-F238E27FC236}">
-                <a16:creationId xmlns="" xmlns:a16="http://schemas.microsoft.com/office/drawing/2014/main" id="{4E596BB1-81C0-4A9D-AF89-5E264D6D787C}"/>
+                <a16:creationId xmlns:a16="http://schemas.microsoft.com/office/drawing/2014/main" xmlns="" id="{4E596BB1-81C0-4A9D-AF89-5E264D6D787C}"/>
               </a:ext>
             </a:extLst>
           </p:cNvPr>
@@ -6773,7 +6773,7 @@
           <a:blip r:embed="rId4" cstate="print">
             <a:extLst>
               <a:ext uri="{28A0092B-C50C-407E-A947-70E740481C1C}">
-                <a14:useLocalDpi xmlns="" xmlns:a14="http://schemas.microsoft.com/office/drawing/2010/main" val="0"/>
+                <a14:useLocalDpi xmlns:a14="http://schemas.microsoft.com/office/drawing/2010/main" xmlns="" val="0"/>
               </a:ext>
             </a:extLst>
           </a:blip>
@@ -6794,7 +6794,7 @@
     </p:spTree>
     <p:extLst>
       <p:ext uri="{BB962C8B-B14F-4D97-AF65-F5344CB8AC3E}">
-        <p14:creationId xmlns="" xmlns:p14="http://schemas.microsoft.com/office/powerpoint/2010/main" val="2755524296"/>
+        <p14:creationId xmlns:p14="http://schemas.microsoft.com/office/powerpoint/2010/main" xmlns="" val="2755524296"/>
       </p:ext>
     </p:extLst>
   </p:cSld>
@@ -6833,7 +6833,7 @@
           <p:cNvPr id="2" name="Title 1">
             <a:extLst>
               <a:ext uri="{FF2B5EF4-FFF2-40B4-BE49-F238E27FC236}">
-                <a16:creationId xmlns="" xmlns:a16="http://schemas.microsoft.com/office/drawing/2014/main" id="{E0F7E4AF-F7ED-4B09-918E-8A07ACAEE2B9}"/>
+                <a16:creationId xmlns:a16="http://schemas.microsoft.com/office/drawing/2014/main" xmlns="" id="{E0F7E4AF-F7ED-4B09-918E-8A07ACAEE2B9}"/>
               </a:ext>
             </a:extLst>
           </p:cNvPr>
@@ -6861,7 +6861,7 @@
           <p:cNvPr id="3" name="Content Placeholder 2">
             <a:extLst>
               <a:ext uri="{FF2B5EF4-FFF2-40B4-BE49-F238E27FC236}">
-                <a16:creationId xmlns="" xmlns:a16="http://schemas.microsoft.com/office/drawing/2014/main" id="{D8CA3B48-BFC3-4CE8-ABA5-33DE2BF3D214}"/>
+                <a16:creationId xmlns:a16="http://schemas.microsoft.com/office/drawing/2014/main" xmlns="" id="{D8CA3B48-BFC3-4CE8-ABA5-33DE2BF3D214}"/>
               </a:ext>
             </a:extLst>
           </p:cNvPr>
@@ -6907,7 +6907,7 @@
           <p:cNvPr id="4" name="Picture 3">
             <a:extLst>
               <a:ext uri="{FF2B5EF4-FFF2-40B4-BE49-F238E27FC236}">
-                <a16:creationId xmlns="" xmlns:a16="http://schemas.microsoft.com/office/drawing/2014/main" id="{06FB59FE-B52F-4C2C-9438-8BA2BF049E33}"/>
+                <a16:creationId xmlns:a16="http://schemas.microsoft.com/office/drawing/2014/main" xmlns="" id="{06FB59FE-B52F-4C2C-9438-8BA2BF049E33}"/>
               </a:ext>
             </a:extLst>
           </p:cNvPr>
@@ -6920,7 +6920,7 @@
           <a:blip r:embed="rId2" cstate="print">
             <a:extLst>
               <a:ext uri="{28A0092B-C50C-407E-A947-70E740481C1C}">
-                <a14:useLocalDpi xmlns="" xmlns:a14="http://schemas.microsoft.com/office/drawing/2010/main" val="0"/>
+                <a14:useLocalDpi xmlns:a14="http://schemas.microsoft.com/office/drawing/2010/main" xmlns="" val="0"/>
               </a:ext>
             </a:extLst>
           </a:blip>
@@ -6941,7 +6941,7 @@
     </p:spTree>
     <p:extLst>
       <p:ext uri="{BB962C8B-B14F-4D97-AF65-F5344CB8AC3E}">
-        <p14:creationId xmlns="" xmlns:p14="http://schemas.microsoft.com/office/powerpoint/2010/main" val="1489102986"/>
+        <p14:creationId xmlns:p14="http://schemas.microsoft.com/office/powerpoint/2010/main" xmlns="" val="1489102986"/>
       </p:ext>
     </p:extLst>
   </p:cSld>
@@ -6980,7 +6980,7 @@
           <p:cNvPr id="2" name="Title 1">
             <a:extLst>
               <a:ext uri="{FF2B5EF4-FFF2-40B4-BE49-F238E27FC236}">
-                <a16:creationId xmlns="" xmlns:a16="http://schemas.microsoft.com/office/drawing/2014/main" id="{D043D610-4505-47F9-8744-878655395FD3}"/>
+                <a16:creationId xmlns:a16="http://schemas.microsoft.com/office/drawing/2014/main" xmlns="" id="{D043D610-4505-47F9-8744-878655395FD3}"/>
               </a:ext>
             </a:extLst>
           </p:cNvPr>
@@ -7009,7 +7009,7 @@
           <p:cNvPr id="3" name="Content Placeholder 2">
             <a:extLst>
               <a:ext uri="{FF2B5EF4-FFF2-40B4-BE49-F238E27FC236}">
-                <a16:creationId xmlns="" xmlns:a16="http://schemas.microsoft.com/office/drawing/2014/main" id="{11AD7357-80CD-434C-A730-12B8A62A81E7}"/>
+                <a16:creationId xmlns:a16="http://schemas.microsoft.com/office/drawing/2014/main" xmlns="" id="{11AD7357-80CD-434C-A730-12B8A62A81E7}"/>
               </a:ext>
             </a:extLst>
           </p:cNvPr>
@@ -7052,7 +7052,7 @@
           <p:cNvPr id="4" name="Picture 3">
             <a:extLst>
               <a:ext uri="{FF2B5EF4-FFF2-40B4-BE49-F238E27FC236}">
-                <a16:creationId xmlns="" xmlns:a16="http://schemas.microsoft.com/office/drawing/2014/main" id="{90BB4250-BB84-4AC9-883A-0733A04A65D5}"/>
+                <a16:creationId xmlns:a16="http://schemas.microsoft.com/office/drawing/2014/main" xmlns="" id="{90BB4250-BB84-4AC9-883A-0733A04A65D5}"/>
               </a:ext>
             </a:extLst>
           </p:cNvPr>
@@ -7065,7 +7065,7 @@
           <a:blip r:embed="rId2" cstate="print">
             <a:extLst>
               <a:ext uri="{28A0092B-C50C-407E-A947-70E740481C1C}">
-                <a14:useLocalDpi xmlns="" xmlns:a14="http://schemas.microsoft.com/office/drawing/2010/main" val="0"/>
+                <a14:useLocalDpi xmlns:a14="http://schemas.microsoft.com/office/drawing/2010/main" xmlns="" val="0"/>
               </a:ext>
             </a:extLst>
           </a:blip>
@@ -7086,7 +7086,7 @@
     </p:spTree>
     <p:extLst>
       <p:ext uri="{BB962C8B-B14F-4D97-AF65-F5344CB8AC3E}">
-        <p14:creationId xmlns="" xmlns:p14="http://schemas.microsoft.com/office/powerpoint/2010/main" val="2145066065"/>
+        <p14:creationId xmlns:p14="http://schemas.microsoft.com/office/powerpoint/2010/main" xmlns="" val="2145066065"/>
       </p:ext>
     </p:extLst>
   </p:cSld>
@@ -7125,7 +7125,7 @@
           <p:cNvPr id="2" name="Title 1">
             <a:extLst>
               <a:ext uri="{FF2B5EF4-FFF2-40B4-BE49-F238E27FC236}">
-                <a16:creationId xmlns="" xmlns:a16="http://schemas.microsoft.com/office/drawing/2014/main" id="{3CE6AB90-DF75-472E-AD77-3775F01A98B3}"/>
+                <a16:creationId xmlns:a16="http://schemas.microsoft.com/office/drawing/2014/main" xmlns="" id="{3CE6AB90-DF75-472E-AD77-3775F01A98B3}"/>
               </a:ext>
             </a:extLst>
           </p:cNvPr>
@@ -7154,7 +7154,7 @@
           <p:cNvPr id="3" name="Content Placeholder 2">
             <a:extLst>
               <a:ext uri="{FF2B5EF4-FFF2-40B4-BE49-F238E27FC236}">
-                <a16:creationId xmlns="" xmlns:a16="http://schemas.microsoft.com/office/drawing/2014/main" id="{69EA60D7-4061-409A-8161-30DF4AA1AE8A}"/>
+                <a16:creationId xmlns:a16="http://schemas.microsoft.com/office/drawing/2014/main" xmlns="" id="{69EA60D7-4061-409A-8161-30DF4AA1AE8A}"/>
               </a:ext>
             </a:extLst>
           </p:cNvPr>
@@ -7230,7 +7230,7 @@
           <p:cNvPr id="4" name="Picture 3">
             <a:extLst>
               <a:ext uri="{FF2B5EF4-FFF2-40B4-BE49-F238E27FC236}">
-                <a16:creationId xmlns="" xmlns:a16="http://schemas.microsoft.com/office/drawing/2014/main" id="{741B2568-12CC-4C2F-B04D-B5FDE1AFA72D}"/>
+                <a16:creationId xmlns:a16="http://schemas.microsoft.com/office/drawing/2014/main" xmlns="" id="{741B2568-12CC-4C2F-B04D-B5FDE1AFA72D}"/>
               </a:ext>
             </a:extLst>
           </p:cNvPr>
@@ -7243,7 +7243,7 @@
           <a:blip r:embed="rId3" cstate="print">
             <a:extLst>
               <a:ext uri="{28A0092B-C50C-407E-A947-70E740481C1C}">
-                <a14:useLocalDpi xmlns="" xmlns:a14="http://schemas.microsoft.com/office/drawing/2010/main" val="0"/>
+                <a14:useLocalDpi xmlns:a14="http://schemas.microsoft.com/office/drawing/2010/main" xmlns="" val="0"/>
               </a:ext>
             </a:extLst>
           </a:blip>
@@ -7266,7 +7266,7 @@
           <p:cNvPr id="5" name="Content Placeholder 2">
             <a:extLst>
               <a:ext uri="{FF2B5EF4-FFF2-40B4-BE49-F238E27FC236}">
-                <a16:creationId xmlns="" xmlns:a16="http://schemas.microsoft.com/office/drawing/2014/main" id="{188A2E33-672F-496D-9FED-A7EDEB426E8B}"/>
+                <a16:creationId xmlns:a16="http://schemas.microsoft.com/office/drawing/2014/main" xmlns="" id="{188A2E33-672F-496D-9FED-A7EDEB426E8B}"/>
               </a:ext>
             </a:extLst>
           </p:cNvPr>
@@ -7598,7 +7598,7 @@
           <p:cNvPr id="7" name="Picture 6">
             <a:extLst>
               <a:ext uri="{FF2B5EF4-FFF2-40B4-BE49-F238E27FC236}">
-                <a16:creationId xmlns="" xmlns:a16="http://schemas.microsoft.com/office/drawing/2014/main" id="{7194B06A-984C-4517-A89C-2217CCE7E6D8}"/>
+                <a16:creationId xmlns:a16="http://schemas.microsoft.com/office/drawing/2014/main" xmlns="" id="{7194B06A-984C-4517-A89C-2217CCE7E6D8}"/>
               </a:ext>
             </a:extLst>
           </p:cNvPr>
@@ -7611,7 +7611,7 @@
           <a:blip r:embed="rId4" cstate="print">
             <a:extLst>
               <a:ext uri="{28A0092B-C50C-407E-A947-70E740481C1C}">
-                <a14:useLocalDpi xmlns="" xmlns:a14="http://schemas.microsoft.com/office/drawing/2010/main" val="0"/>
+                <a14:useLocalDpi xmlns:a14="http://schemas.microsoft.com/office/drawing/2010/main" xmlns="" val="0"/>
               </a:ext>
             </a:extLst>
           </a:blip>
@@ -7655,7 +7655,7 @@
     </p:spTree>
     <p:extLst>
       <p:ext uri="{BB962C8B-B14F-4D97-AF65-F5344CB8AC3E}">
-        <p14:creationId xmlns="" xmlns:p14="http://schemas.microsoft.com/office/powerpoint/2010/main" val="3717006473"/>
+        <p14:creationId xmlns:p14="http://schemas.microsoft.com/office/powerpoint/2010/main" xmlns="" val="3717006473"/>
       </p:ext>
     </p:extLst>
   </p:cSld>
@@ -7694,7 +7694,7 @@
           <p:cNvPr id="8" name="Oval 7">
             <a:extLst>
               <a:ext uri="{FF2B5EF4-FFF2-40B4-BE49-F238E27FC236}">
-                <a16:creationId xmlns="" xmlns:a16="http://schemas.microsoft.com/office/drawing/2014/main" id="{552A35DA-0C5D-44FA-9872-AC54B0A3A4D7}"/>
+                <a16:creationId xmlns:a16="http://schemas.microsoft.com/office/drawing/2014/main" xmlns="" id="{552A35DA-0C5D-44FA-9872-AC54B0A3A4D7}"/>
               </a:ext>
             </a:extLst>
           </p:cNvPr>
@@ -7740,7 +7740,7 @@
           <p:cNvPr id="2" name="Title 1">
             <a:extLst>
               <a:ext uri="{FF2B5EF4-FFF2-40B4-BE49-F238E27FC236}">
-                <a16:creationId xmlns="" xmlns:a16="http://schemas.microsoft.com/office/drawing/2014/main" id="{35ACCF0E-D6FE-421E-BA99-91383EEB7C52}"/>
+                <a16:creationId xmlns:a16="http://schemas.microsoft.com/office/drawing/2014/main" xmlns="" id="{35ACCF0E-D6FE-421E-BA99-91383EEB7C52}"/>
               </a:ext>
             </a:extLst>
           </p:cNvPr>
@@ -7769,7 +7769,7 @@
           <p:cNvPr id="3" name="Content Placeholder 2">
             <a:extLst>
               <a:ext uri="{FF2B5EF4-FFF2-40B4-BE49-F238E27FC236}">
-                <a16:creationId xmlns="" xmlns:a16="http://schemas.microsoft.com/office/drawing/2014/main" id="{F6EF4FD1-9028-4BA5-AA0F-321E6244028D}"/>
+                <a16:creationId xmlns:a16="http://schemas.microsoft.com/office/drawing/2014/main" xmlns="" id="{F6EF4FD1-9028-4BA5-AA0F-321E6244028D}"/>
               </a:ext>
             </a:extLst>
           </p:cNvPr>
@@ -7802,7 +7802,7 @@
           <p:cNvPr id="4" name="Picture 3">
             <a:extLst>
               <a:ext uri="{FF2B5EF4-FFF2-40B4-BE49-F238E27FC236}">
-                <a16:creationId xmlns="" xmlns:a16="http://schemas.microsoft.com/office/drawing/2014/main" id="{89F1976A-F61B-4422-9B67-C0F001252090}"/>
+                <a16:creationId xmlns:a16="http://schemas.microsoft.com/office/drawing/2014/main" xmlns="" id="{89F1976A-F61B-4422-9B67-C0F001252090}"/>
               </a:ext>
             </a:extLst>
           </p:cNvPr>
@@ -7815,7 +7815,7 @@
           <a:blip r:embed="rId3" cstate="print">
             <a:extLst>
               <a:ext uri="{28A0092B-C50C-407E-A947-70E740481C1C}">
-                <a14:useLocalDpi xmlns="" xmlns:a14="http://schemas.microsoft.com/office/drawing/2010/main" val="0"/>
+                <a14:useLocalDpi xmlns:a14="http://schemas.microsoft.com/office/drawing/2010/main" xmlns="" val="0"/>
               </a:ext>
             </a:extLst>
           </a:blip>
@@ -7838,7 +7838,7 @@
           <p:cNvPr id="5" name="Content Placeholder 2">
             <a:extLst>
               <a:ext uri="{FF2B5EF4-FFF2-40B4-BE49-F238E27FC236}">
-                <a16:creationId xmlns="" xmlns:a16="http://schemas.microsoft.com/office/drawing/2014/main" id="{85BD8BDC-A299-4E5C-9207-6B1ABA39F3E9}"/>
+                <a16:creationId xmlns:a16="http://schemas.microsoft.com/office/drawing/2014/main" xmlns="" id="{85BD8BDC-A299-4E5C-9207-6B1ABA39F3E9}"/>
               </a:ext>
             </a:extLst>
           </p:cNvPr>
@@ -8160,7 +8160,7 @@
           <p:cNvPr id="7" name="Picture 6">
             <a:extLst>
               <a:ext uri="{FF2B5EF4-FFF2-40B4-BE49-F238E27FC236}">
-                <a16:creationId xmlns="" xmlns:a16="http://schemas.microsoft.com/office/drawing/2014/main" id="{51BCDF80-65A3-4CB9-9B75-EAC219AA4963}"/>
+                <a16:creationId xmlns:a16="http://schemas.microsoft.com/office/drawing/2014/main" xmlns="" id="{51BCDF80-65A3-4CB9-9B75-EAC219AA4963}"/>
               </a:ext>
             </a:extLst>
           </p:cNvPr>
@@ -8173,7 +8173,7 @@
           <a:blip r:embed="rId4" cstate="print">
             <a:extLst>
               <a:ext uri="{BEBA8EAE-BF5A-486C-A8C5-ECC9F3942E4B}">
-                <a14:imgProps xmlns="" xmlns:a14="http://schemas.microsoft.com/office/drawing/2010/main">
+                <a14:imgProps xmlns:a14="http://schemas.microsoft.com/office/drawing/2010/main" xmlns="">
                   <a14:imgLayer r:embed="rId5">
                     <a14:imgEffect>
                       <a14:backgroundRemoval t="10000" b="90000" l="10000" r="90000"/>
@@ -8182,7 +8182,7 @@
                 </a14:imgProps>
               </a:ext>
               <a:ext uri="{28A0092B-C50C-407E-A947-70E740481C1C}">
-                <a14:useLocalDpi xmlns="" xmlns:a14="http://schemas.microsoft.com/office/drawing/2010/main" val="0"/>
+                <a14:useLocalDpi xmlns:a14="http://schemas.microsoft.com/office/drawing/2010/main" xmlns="" val="0"/>
               </a:ext>
             </a:extLst>
           </a:blip>
@@ -8203,7 +8203,7 @@
     </p:spTree>
     <p:extLst>
       <p:ext uri="{BB962C8B-B14F-4D97-AF65-F5344CB8AC3E}">
-        <p14:creationId xmlns="" xmlns:p14="http://schemas.microsoft.com/office/powerpoint/2010/main" val="2716024304"/>
+        <p14:creationId xmlns:p14="http://schemas.microsoft.com/office/powerpoint/2010/main" xmlns="" val="2716024304"/>
       </p:ext>
     </p:extLst>
   </p:cSld>
@@ -8242,7 +8242,7 @@
           <p:cNvPr id="2" name="Title 1">
             <a:extLst>
               <a:ext uri="{FF2B5EF4-FFF2-40B4-BE49-F238E27FC236}">
-                <a16:creationId xmlns="" xmlns:a16="http://schemas.microsoft.com/office/drawing/2014/main" id="{1D8718C7-CAD2-4A55-8CED-01B5365C1260}"/>
+                <a16:creationId xmlns:a16="http://schemas.microsoft.com/office/drawing/2014/main" xmlns="" id="{1D8718C7-CAD2-4A55-8CED-01B5365C1260}"/>
               </a:ext>
             </a:extLst>
           </p:cNvPr>
@@ -8271,7 +8271,7 @@
           <p:cNvPr id="6" name="Content Placeholder 5">
             <a:extLst>
               <a:ext uri="{FF2B5EF4-FFF2-40B4-BE49-F238E27FC236}">
-                <a16:creationId xmlns="" xmlns:a16="http://schemas.microsoft.com/office/drawing/2014/main" id="{DAE12B24-F807-495D-90F7-62B7790B187B}"/>
+                <a16:creationId xmlns:a16="http://schemas.microsoft.com/office/drawing/2014/main" xmlns="" id="{DAE12B24-F807-495D-90F7-62B7790B187B}"/>
               </a:ext>
             </a:extLst>
           </p:cNvPr>
@@ -8286,7 +8286,7 @@
           <a:blip r:embed="rId2" cstate="print">
             <a:extLst>
               <a:ext uri="{28A0092B-C50C-407E-A947-70E740481C1C}">
-                <a14:useLocalDpi xmlns="" xmlns:a14="http://schemas.microsoft.com/office/drawing/2010/main" val="0"/>
+                <a14:useLocalDpi xmlns:a14="http://schemas.microsoft.com/office/drawing/2010/main" xmlns="" val="0"/>
               </a:ext>
             </a:extLst>
           </a:blip>
@@ -8306,7 +8306,7 @@
           <p:cNvPr id="4" name="Picture 3">
             <a:extLst>
               <a:ext uri="{FF2B5EF4-FFF2-40B4-BE49-F238E27FC236}">
-                <a16:creationId xmlns="" xmlns:a16="http://schemas.microsoft.com/office/drawing/2014/main" id="{08DD0372-F361-4655-AFE7-2855BB164970}"/>
+                <a16:creationId xmlns:a16="http://schemas.microsoft.com/office/drawing/2014/main" xmlns="" id="{08DD0372-F361-4655-AFE7-2855BB164970}"/>
               </a:ext>
             </a:extLst>
           </p:cNvPr>
@@ -8319,7 +8319,7 @@
           <a:blip r:embed="rId3" cstate="print">
             <a:extLst>
               <a:ext uri="{28A0092B-C50C-407E-A947-70E740481C1C}">
-                <a14:useLocalDpi xmlns="" xmlns:a14="http://schemas.microsoft.com/office/drawing/2010/main" val="0"/>
+                <a14:useLocalDpi xmlns:a14="http://schemas.microsoft.com/office/drawing/2010/main" xmlns="" val="0"/>
               </a:ext>
             </a:extLst>
           </a:blip>
@@ -8342,7 +8342,7 @@
           <p:cNvPr id="8" name="Picture 7">
             <a:extLst>
               <a:ext uri="{FF2B5EF4-FFF2-40B4-BE49-F238E27FC236}">
-                <a16:creationId xmlns="" xmlns:a16="http://schemas.microsoft.com/office/drawing/2014/main" id="{FA4961E7-DDCE-492B-9E32-EA4461B5A637}"/>
+                <a16:creationId xmlns:a16="http://schemas.microsoft.com/office/drawing/2014/main" xmlns="" id="{FA4961E7-DDCE-492B-9E32-EA4461B5A637}"/>
               </a:ext>
             </a:extLst>
           </p:cNvPr>
@@ -8355,7 +8355,7 @@
           <a:blip r:embed="rId4" cstate="print">
             <a:extLst>
               <a:ext uri="{28A0092B-C50C-407E-A947-70E740481C1C}">
-                <a14:useLocalDpi xmlns="" xmlns:a14="http://schemas.microsoft.com/office/drawing/2010/main" val="0"/>
+                <a14:useLocalDpi xmlns:a14="http://schemas.microsoft.com/office/drawing/2010/main" xmlns="" val="0"/>
               </a:ext>
             </a:extLst>
           </a:blip>
@@ -8378,7 +8378,7 @@
           <p:cNvPr id="10" name="Picture 9">
             <a:extLst>
               <a:ext uri="{FF2B5EF4-FFF2-40B4-BE49-F238E27FC236}">
-                <a16:creationId xmlns="" xmlns:a16="http://schemas.microsoft.com/office/drawing/2014/main" id="{597A64EE-AE78-46DC-B8C0-26A00BA2824B}"/>
+                <a16:creationId xmlns:a16="http://schemas.microsoft.com/office/drawing/2014/main" xmlns="" id="{597A64EE-AE78-46DC-B8C0-26A00BA2824B}"/>
               </a:ext>
             </a:extLst>
           </p:cNvPr>
@@ -8391,7 +8391,7 @@
           <a:blip r:embed="rId5" cstate="print">
             <a:extLst>
               <a:ext uri="{28A0092B-C50C-407E-A947-70E740481C1C}">
-                <a14:useLocalDpi xmlns="" xmlns:a14="http://schemas.microsoft.com/office/drawing/2010/main" val="0"/>
+                <a14:useLocalDpi xmlns:a14="http://schemas.microsoft.com/office/drawing/2010/main" xmlns="" val="0"/>
               </a:ext>
             </a:extLst>
           </a:blip>
@@ -8446,7 +8446,7 @@
           <p:cNvPr id="13" name="Straight Arrow Connector 12">
             <a:extLst>
               <a:ext uri="{FF2B5EF4-FFF2-40B4-BE49-F238E27FC236}">
-                <a16:creationId xmlns="" xmlns:a16="http://schemas.microsoft.com/office/drawing/2014/main" id="{516D49CA-B0F7-4E22-BD32-A5CDD1926868}"/>
+                <a16:creationId xmlns:a16="http://schemas.microsoft.com/office/drawing/2014/main" xmlns="" id="{516D49CA-B0F7-4E22-BD32-A5CDD1926868}"/>
               </a:ext>
             </a:extLst>
           </p:cNvPr>
@@ -8485,7 +8485,7 @@
     </p:spTree>
     <p:extLst>
       <p:ext uri="{BB962C8B-B14F-4D97-AF65-F5344CB8AC3E}">
-        <p14:creationId xmlns="" xmlns:p14="http://schemas.microsoft.com/office/powerpoint/2010/main" val="1935535134"/>
+        <p14:creationId xmlns:p14="http://schemas.microsoft.com/office/powerpoint/2010/main" xmlns="" val="1935535134"/>
       </p:ext>
     </p:extLst>
   </p:cSld>
@@ -8524,7 +8524,7 @@
           <p:cNvPr id="2" name="Title 1">
             <a:extLst>
               <a:ext uri="{FF2B5EF4-FFF2-40B4-BE49-F238E27FC236}">
-                <a16:creationId xmlns="" xmlns:a16="http://schemas.microsoft.com/office/drawing/2014/main" id="{22185D28-3B81-4B35-B6F7-3DCAF5E34A9E}"/>
+                <a16:creationId xmlns:a16="http://schemas.microsoft.com/office/drawing/2014/main" xmlns="" id="{22185D28-3B81-4B35-B6F7-3DCAF5E34A9E}"/>
               </a:ext>
             </a:extLst>
           </p:cNvPr>
@@ -8553,7 +8553,7 @@
           <p:cNvPr id="3" name="Content Placeholder 2">
             <a:extLst>
               <a:ext uri="{FF2B5EF4-FFF2-40B4-BE49-F238E27FC236}">
-                <a16:creationId xmlns="" xmlns:a16="http://schemas.microsoft.com/office/drawing/2014/main" id="{7AC224F6-28B1-4A42-864A-2ED9DA883E13}"/>
+                <a16:creationId xmlns:a16="http://schemas.microsoft.com/office/drawing/2014/main" xmlns="" id="{7AC224F6-28B1-4A42-864A-2ED9DA883E13}"/>
               </a:ext>
             </a:extLst>
           </p:cNvPr>
@@ -8569,10 +8569,7 @@
           <a:bodyPr/>
           <a:lstStyle/>
           <a:p>
-            <a:r>
-              <a:rPr lang="en-GB" dirty="0"/>
-              <a:t>*Gameplay vids/gifs go here*</a:t>
-            </a:r>
+            <a:endParaRPr lang="en-GB" dirty="0"/>
           </a:p>
         </p:txBody>
       </p:sp>
@@ -8581,7 +8578,7 @@
           <p:cNvPr id="4" name="Picture 3">
             <a:extLst>
               <a:ext uri="{FF2B5EF4-FFF2-40B4-BE49-F238E27FC236}">
-                <a16:creationId xmlns="" xmlns:a16="http://schemas.microsoft.com/office/drawing/2014/main" id="{8A06DB27-579B-48E2-ACEB-09CAC9579B5E}"/>
+                <a16:creationId xmlns:a16="http://schemas.microsoft.com/office/drawing/2014/main" xmlns="" id="{8A06DB27-579B-48E2-ACEB-09CAC9579B5E}"/>
               </a:ext>
             </a:extLst>
           </p:cNvPr>
@@ -8591,10 +8588,10 @@
           <p:nvPr/>
         </p:nvPicPr>
         <p:blipFill>
-          <a:blip r:embed="rId2" cstate="print">
+          <a:blip r:embed="rId3" cstate="print">
             <a:extLst>
               <a:ext uri="{28A0092B-C50C-407E-A947-70E740481C1C}">
-                <a14:useLocalDpi xmlns="" xmlns:a14="http://schemas.microsoft.com/office/drawing/2010/main" val="0"/>
+                <a14:useLocalDpi xmlns:a14="http://schemas.microsoft.com/office/drawing/2010/main" xmlns="" val="0"/>
               </a:ext>
             </a:extLst>
           </a:blip>
@@ -8612,10 +8609,38 @@
           </a:prstGeom>
         </p:spPr>
       </p:pic>
+      <p:pic>
+        <p:nvPicPr>
+          <p:cNvPr id="6" name="GoNuts_FirstVideoTest.avi">
+            <a:hlinkClick r:id="" action="ppaction://media"/>
+          </p:cNvPr>
+          <p:cNvPicPr>
+            <a:picLocks noRot="1" noChangeAspect="1"/>
+          </p:cNvPicPr>
+          <p:nvPr>
+            <a:videoFile r:link="rId1"/>
+          </p:nvPr>
+        </p:nvPicPr>
+        <p:blipFill>
+          <a:blip r:embed="rId4" cstate="print"/>
+          <a:stretch>
+            <a:fillRect/>
+          </a:stretch>
+        </p:blipFill>
+        <p:spPr>
+          <a:xfrm>
+            <a:off x="1602557" y="1432284"/>
+            <a:ext cx="9260264" cy="5208899"/>
+          </a:xfrm>
+          <a:prstGeom prst="rect">
+            <a:avLst/>
+          </a:prstGeom>
+        </p:spPr>
+      </p:pic>
     </p:spTree>
     <p:extLst>
       <p:ext uri="{BB962C8B-B14F-4D97-AF65-F5344CB8AC3E}">
-        <p14:creationId xmlns="" xmlns:p14="http://schemas.microsoft.com/office/powerpoint/2010/main" val="1929326837"/>
+        <p14:creationId xmlns:p14="http://schemas.microsoft.com/office/powerpoint/2010/main" xmlns="" val="1929326837"/>
       </p:ext>
     </p:extLst>
   </p:cSld>
@@ -8625,7 +8650,150 @@
   <p:timing>
     <p:tnLst>
       <p:par>
-        <p:cTn id="1" dur="indefinite" restart="never" nodeType="tmRoot"/>
+        <p:cTn id="1" dur="indefinite" restart="never" nodeType="tmRoot">
+          <p:childTnLst>
+            <p:seq concurrent="1" nextAc="seek">
+              <p:cTn id="2" dur="indefinite" nodeType="mainSeq">
+                <p:childTnLst>
+                  <p:par>
+                    <p:cTn id="3" fill="hold">
+                      <p:stCondLst>
+                        <p:cond delay="indefinite"/>
+                        <p:cond evt="onBegin" delay="0">
+                          <p:tn val="2"/>
+                        </p:cond>
+                      </p:stCondLst>
+                      <p:childTnLst>
+                        <p:par>
+                          <p:cTn id="4" fill="hold">
+                            <p:stCondLst>
+                              <p:cond delay="0"/>
+                            </p:stCondLst>
+                            <p:childTnLst>
+                              <p:par>
+                                <p:cTn id="5" presetID="1" presetClass="mediacall" presetSubtype="0" fill="hold" nodeType="afterEffect">
+                                  <p:stCondLst>
+                                    <p:cond delay="0"/>
+                                  </p:stCondLst>
+                                  <p:childTnLst>
+                                    <p:cmd type="call" cmd="playFrom(0.0)">
+                                      <p:cBhvr>
+                                        <p:cTn id="6" dur="95053" fill="hold"/>
+                                        <p:tgtEl>
+                                          <p:spTgt spid="6"/>
+                                        </p:tgtEl>
+                                      </p:cBhvr>
+                                    </p:cmd>
+                                  </p:childTnLst>
+                                </p:cTn>
+                              </p:par>
+                            </p:childTnLst>
+                          </p:cTn>
+                        </p:par>
+                      </p:childTnLst>
+                    </p:cTn>
+                  </p:par>
+                </p:childTnLst>
+              </p:cTn>
+              <p:prevCondLst>
+                <p:cond evt="onPrev" delay="0">
+                  <p:tgtEl>
+                    <p:sldTgt/>
+                  </p:tgtEl>
+                </p:cond>
+              </p:prevCondLst>
+              <p:nextCondLst>
+                <p:cond evt="onNext" delay="0">
+                  <p:tgtEl>
+                    <p:sldTgt/>
+                  </p:tgtEl>
+                </p:cond>
+              </p:nextCondLst>
+            </p:seq>
+            <p:video>
+              <p:cMediaNode>
+                <p:cTn id="7" fill="hold" display="0">
+                  <p:stCondLst>
+                    <p:cond delay="indefinite"/>
+                  </p:stCondLst>
+                  <p:endCondLst>
+                    <p:cond evt="onNext" delay="0">
+                      <p:tgtEl>
+                        <p:sldTgt/>
+                      </p:tgtEl>
+                    </p:cond>
+                    <p:cond evt="onPrev" delay="0">
+                      <p:tgtEl>
+                        <p:sldTgt/>
+                      </p:tgtEl>
+                    </p:cond>
+                  </p:endCondLst>
+                </p:cTn>
+                <p:tgtEl>
+                  <p:spTgt spid="6"/>
+                </p:tgtEl>
+              </p:cMediaNode>
+            </p:video>
+            <p:seq concurrent="1" nextAc="seek">
+              <p:cTn id="8" restart="whenNotActive" fill="hold" evtFilter="cancelBubble" nodeType="interactiveSeq">
+                <p:stCondLst>
+                  <p:cond evt="onClick" delay="0">
+                    <p:tgtEl>
+                      <p:spTgt spid="6"/>
+                    </p:tgtEl>
+                  </p:cond>
+                </p:stCondLst>
+                <p:endSync evt="end" delay="0">
+                  <p:rtn val="all"/>
+                </p:endSync>
+                <p:childTnLst>
+                  <p:par>
+                    <p:cTn id="9" fill="hold">
+                      <p:stCondLst>
+                        <p:cond delay="0"/>
+                      </p:stCondLst>
+                      <p:childTnLst>
+                        <p:par>
+                          <p:cTn id="10" fill="hold">
+                            <p:stCondLst>
+                              <p:cond delay="0"/>
+                            </p:stCondLst>
+                            <p:childTnLst>
+                              <p:par>
+                                <p:cTn id="11" presetID="2" presetClass="mediacall" presetSubtype="0" fill="hold" nodeType="clickEffect">
+                                  <p:stCondLst>
+                                    <p:cond delay="0"/>
+                                  </p:stCondLst>
+                                  <p:childTnLst>
+                                    <p:cmd type="call" cmd="togglePause">
+                                      <p:cBhvr>
+                                        <p:cTn id="12" dur="1" fill="hold"/>
+                                        <p:tgtEl>
+                                          <p:spTgt spid="6"/>
+                                        </p:tgtEl>
+                                      </p:cBhvr>
+                                    </p:cmd>
+                                  </p:childTnLst>
+                                </p:cTn>
+                              </p:par>
+                            </p:childTnLst>
+                          </p:cTn>
+                        </p:par>
+                      </p:childTnLst>
+                    </p:cTn>
+                  </p:par>
+                </p:childTnLst>
+              </p:cTn>
+              <p:nextCondLst>
+                <p:cond evt="onClick" delay="0">
+                  <p:tgtEl>
+                    <p:spTgt spid="6"/>
+                  </p:tgtEl>
+                </p:cond>
+              </p:nextCondLst>
+            </p:seq>
+          </p:childTnLst>
+        </p:cTn>
       </p:par>
     </p:tnLst>
   </p:timing>
@@ -8654,7 +8822,7 @@
           <p:cNvPr id="2" name="Title 1">
             <a:extLst>
               <a:ext uri="{FF2B5EF4-FFF2-40B4-BE49-F238E27FC236}">
-                <a16:creationId xmlns="" xmlns:a16="http://schemas.microsoft.com/office/drawing/2014/main" id="{BE75E444-1504-4EB6-99F0-27C062A2514B}"/>
+                <a16:creationId xmlns:a16="http://schemas.microsoft.com/office/drawing/2014/main" xmlns="" id="{BE75E444-1504-4EB6-99F0-27C062A2514B}"/>
               </a:ext>
             </a:extLst>
           </p:cNvPr>
@@ -8683,7 +8851,7 @@
           <p:cNvPr id="3" name="Content Placeholder 2">
             <a:extLst>
               <a:ext uri="{FF2B5EF4-FFF2-40B4-BE49-F238E27FC236}">
-                <a16:creationId xmlns="" xmlns:a16="http://schemas.microsoft.com/office/drawing/2014/main" id="{B9C2A57B-51BB-44D6-A6D0-2EF8F6F37310}"/>
+                <a16:creationId xmlns:a16="http://schemas.microsoft.com/office/drawing/2014/main" xmlns="" id="{B9C2A57B-51BB-44D6-A6D0-2EF8F6F37310}"/>
               </a:ext>
             </a:extLst>
           </p:cNvPr>
@@ -8742,7 +8910,7 @@
           <p:cNvPr id="4" name="Picture 3">
             <a:extLst>
               <a:ext uri="{FF2B5EF4-FFF2-40B4-BE49-F238E27FC236}">
-                <a16:creationId xmlns="" xmlns:a16="http://schemas.microsoft.com/office/drawing/2014/main" id="{1B9EA258-D179-4AF5-91C9-08A033D12895}"/>
+                <a16:creationId xmlns:a16="http://schemas.microsoft.com/office/drawing/2014/main" xmlns="" id="{1B9EA258-D179-4AF5-91C9-08A033D12895}"/>
               </a:ext>
             </a:extLst>
           </p:cNvPr>
@@ -8755,7 +8923,7 @@
           <a:blip r:embed="rId2" cstate="print">
             <a:extLst>
               <a:ext uri="{28A0092B-C50C-407E-A947-70E740481C1C}">
-                <a14:useLocalDpi xmlns="" xmlns:a14="http://schemas.microsoft.com/office/drawing/2010/main" val="0"/>
+                <a14:useLocalDpi xmlns:a14="http://schemas.microsoft.com/office/drawing/2010/main" xmlns="" val="0"/>
               </a:ext>
             </a:extLst>
           </a:blip>
@@ -8776,7 +8944,7 @@
     </p:spTree>
     <p:extLst>
       <p:ext uri="{BB962C8B-B14F-4D97-AF65-F5344CB8AC3E}">
-        <p14:creationId xmlns="" xmlns:p14="http://schemas.microsoft.com/office/powerpoint/2010/main" val="3985286661"/>
+        <p14:creationId xmlns:p14="http://schemas.microsoft.com/office/powerpoint/2010/main" xmlns="" val="3985286661"/>
       </p:ext>
     </p:extLst>
   </p:cSld>
@@ -8815,7 +8983,7 @@
           <p:cNvPr id="2" name="Title 1">
             <a:extLst>
               <a:ext uri="{FF2B5EF4-FFF2-40B4-BE49-F238E27FC236}">
-                <a16:creationId xmlns="" xmlns:a16="http://schemas.microsoft.com/office/drawing/2014/main" id="{804D6BEF-CAC3-4E5F-94C1-42D03EF78D17}"/>
+                <a16:creationId xmlns:a16="http://schemas.microsoft.com/office/drawing/2014/main" xmlns="" id="{804D6BEF-CAC3-4E5F-94C1-42D03EF78D17}"/>
               </a:ext>
             </a:extLst>
           </p:cNvPr>
@@ -8844,7 +9012,7 @@
           <p:cNvPr id="3" name="Content Placeholder 2">
             <a:extLst>
               <a:ext uri="{FF2B5EF4-FFF2-40B4-BE49-F238E27FC236}">
-                <a16:creationId xmlns="" xmlns:a16="http://schemas.microsoft.com/office/drawing/2014/main" id="{4E56754D-69A4-432A-A381-04F413EB7E26}"/>
+                <a16:creationId xmlns:a16="http://schemas.microsoft.com/office/drawing/2014/main" xmlns="" id="{4E56754D-69A4-432A-A381-04F413EB7E26}"/>
               </a:ext>
             </a:extLst>
           </p:cNvPr>
@@ -8890,7 +9058,7 @@
           <p:cNvPr id="4" name="Picture 3">
             <a:extLst>
               <a:ext uri="{FF2B5EF4-FFF2-40B4-BE49-F238E27FC236}">
-                <a16:creationId xmlns="" xmlns:a16="http://schemas.microsoft.com/office/drawing/2014/main" id="{CE8F705F-E7A0-4D58-949D-E7A614792454}"/>
+                <a16:creationId xmlns:a16="http://schemas.microsoft.com/office/drawing/2014/main" xmlns="" id="{CE8F705F-E7A0-4D58-949D-E7A614792454}"/>
               </a:ext>
             </a:extLst>
           </p:cNvPr>
@@ -8903,7 +9071,7 @@
           <a:blip r:embed="rId2" cstate="print">
             <a:extLst>
               <a:ext uri="{28A0092B-C50C-407E-A947-70E740481C1C}">
-                <a14:useLocalDpi xmlns="" xmlns:a14="http://schemas.microsoft.com/office/drawing/2010/main" val="0"/>
+                <a14:useLocalDpi xmlns:a14="http://schemas.microsoft.com/office/drawing/2010/main" xmlns="" val="0"/>
               </a:ext>
             </a:extLst>
           </a:blip>
@@ -8926,7 +9094,7 @@
           <p:cNvPr id="7" name="Content Placeholder 2">
             <a:extLst>
               <a:ext uri="{FF2B5EF4-FFF2-40B4-BE49-F238E27FC236}">
-                <a16:creationId xmlns="" xmlns:a16="http://schemas.microsoft.com/office/drawing/2014/main" id="{041F66B2-4920-4C66-9023-DAB1E5D25A69}"/>
+                <a16:creationId xmlns:a16="http://schemas.microsoft.com/office/drawing/2014/main" xmlns="" id="{041F66B2-4920-4C66-9023-DAB1E5D25A69}"/>
               </a:ext>
             </a:extLst>
           </p:cNvPr>
@@ -9224,7 +9392,7 @@
     </p:spTree>
     <p:extLst>
       <p:ext uri="{BB962C8B-B14F-4D97-AF65-F5344CB8AC3E}">
-        <p14:creationId xmlns="" xmlns:p14="http://schemas.microsoft.com/office/powerpoint/2010/main" val="1980736762"/>
+        <p14:creationId xmlns:p14="http://schemas.microsoft.com/office/powerpoint/2010/main" xmlns="" val="1980736762"/>
       </p:ext>
     </p:extLst>
   </p:cSld>
@@ -9496,7 +9664,7 @@
   <a:extraClrSchemeLst/>
   <a:extLst>
     <a:ext uri="{05A4C25C-085E-4340-85A3-A5531E510DB2}">
-      <thm15:themeFamily xmlns="" xmlns:thm15="http://schemas.microsoft.com/office/thememl/2012/main" name="Depth" id="{7BEAFC2A-325C-49C4-AC08-2B765DA903F9}" vid="{1735E755-43E6-43AA-ABA2-C989ECC79AF5}"/>
+      <thm15:themeFamily xmlns:thm15="http://schemas.microsoft.com/office/thememl/2012/main" xmlns="" name="Depth" id="{7BEAFC2A-325C-49C4-AC08-2B765DA903F9}" vid="{1735E755-43E6-43AA-ABA2-C989ECC79AF5}"/>
     </a:ext>
   </a:extLst>
 </a:theme>
@@ -9791,7 +9959,7 @@
   <a:extraClrSchemeLst/>
   <a:extLst>
     <a:ext uri="{05A4C25C-085E-4340-85A3-A5531E510DB2}">
-      <thm15:themeFamily xmlns="" xmlns:thm15="http://schemas.microsoft.com/office/thememl/2012/main" name="Office Theme" id="{62F939B6-93AF-4DB8-9C6B-D6C7DFDC589F}" vid="{4A3C46E8-61CC-4603-A589-7422A47A8E4A}"/>
+      <thm15:themeFamily xmlns:thm15="http://schemas.microsoft.com/office/thememl/2012/main" xmlns="" name="Office Theme" id="{62F939B6-93AF-4DB8-9C6B-D6C7DFDC589F}" vid="{4A3C46E8-61CC-4603-A589-7422A47A8E4A}"/>
     </a:ext>
   </a:extLst>
 </a:theme>

</xml_diff>

<commit_message>
Added The Gameloop to presentation
</commit_message>
<xml_diff>
--- a/Group/Presentations/Pitch #2 (New).pptx
+++ b/Group/Presentations/Pitch #2 (New).pptx
@@ -118,7 +118,7 @@
   </p:defaultTextStyle>
   <p:extLst>
     <p:ext uri="{EFAFB233-063F-42B5-8137-9DF3F51BA10A}">
-      <p15:sldGuideLst xmlns:p15="http://schemas.microsoft.com/office/powerpoint/2012/main" xmlns=""/>
+      <p15:sldGuideLst xmlns="" xmlns:p15="http://schemas.microsoft.com/office/powerpoint/2012/main"/>
     </p:ext>
   </p:extLst>
 </p:presentation>
@@ -380,7 +380,7 @@
     </p:spTree>
     <p:extLst>
       <p:ext uri="{BB962C8B-B14F-4D97-AF65-F5344CB8AC3E}">
-        <p14:creationId xmlns:p14="http://schemas.microsoft.com/office/powerpoint/2010/main" xmlns="" val="2712662513"/>
+        <p14:creationId xmlns="" xmlns:p14="http://schemas.microsoft.com/office/powerpoint/2010/main" val="2712662513"/>
       </p:ext>
     </p:extLst>
   </p:cSld>
@@ -555,7 +555,7 @@
     </p:spTree>
     <p:extLst>
       <p:ext uri="{BB962C8B-B14F-4D97-AF65-F5344CB8AC3E}">
-        <p14:creationId xmlns:p14="http://schemas.microsoft.com/office/powerpoint/2010/main" xmlns="" val="344233343"/>
+        <p14:creationId xmlns="" xmlns:p14="http://schemas.microsoft.com/office/powerpoint/2010/main" val="344233343"/>
       </p:ext>
     </p:extLst>
   </p:cSld>
@@ -711,7 +711,7 @@
     </p:spTree>
     <p:extLst>
       <p:ext uri="{BB962C8B-B14F-4D97-AF65-F5344CB8AC3E}">
-        <p14:creationId xmlns:p14="http://schemas.microsoft.com/office/powerpoint/2010/main" xmlns="" val="843437973"/>
+        <p14:creationId xmlns="" xmlns:p14="http://schemas.microsoft.com/office/powerpoint/2010/main" val="843437973"/>
       </p:ext>
     </p:extLst>
   </p:cSld>
@@ -970,7 +970,7 @@
     </p:spTree>
     <p:extLst>
       <p:ext uri="{BB962C8B-B14F-4D97-AF65-F5344CB8AC3E}">
-        <p14:creationId xmlns:p14="http://schemas.microsoft.com/office/powerpoint/2010/main" xmlns="" val="1137906455"/>
+        <p14:creationId xmlns="" xmlns:p14="http://schemas.microsoft.com/office/powerpoint/2010/main" val="1137906455"/>
       </p:ext>
     </p:extLst>
   </p:cSld>
@@ -1253,7 +1253,7 @@
     </p:spTree>
     <p:extLst>
       <p:ext uri="{BB962C8B-B14F-4D97-AF65-F5344CB8AC3E}">
-        <p14:creationId xmlns:p14="http://schemas.microsoft.com/office/powerpoint/2010/main" xmlns="" val="1051877521"/>
+        <p14:creationId xmlns="" xmlns:p14="http://schemas.microsoft.com/office/powerpoint/2010/main" val="1051877521"/>
       </p:ext>
     </p:extLst>
   </p:cSld>
@@ -1447,7 +1447,7 @@
     </p:spTree>
     <p:extLst>
       <p:ext uri="{BB962C8B-B14F-4D97-AF65-F5344CB8AC3E}">
-        <p14:creationId xmlns:p14="http://schemas.microsoft.com/office/powerpoint/2010/main" xmlns="" val="2305167636"/>
+        <p14:creationId xmlns="" xmlns:p14="http://schemas.microsoft.com/office/powerpoint/2010/main" val="2305167636"/>
       </p:ext>
     </p:extLst>
   </p:cSld>
@@ -1942,7 +1942,7 @@
     </p:spTree>
     <p:extLst>
       <p:ext uri="{BB962C8B-B14F-4D97-AF65-F5344CB8AC3E}">
-        <p14:creationId xmlns:p14="http://schemas.microsoft.com/office/powerpoint/2010/main" xmlns="" val="3536611326"/>
+        <p14:creationId xmlns="" xmlns:p14="http://schemas.microsoft.com/office/powerpoint/2010/main" val="3536611326"/>
       </p:ext>
     </p:extLst>
   </p:cSld>
@@ -2138,7 +2138,7 @@
     </p:spTree>
     <p:extLst>
       <p:ext uri="{BB962C8B-B14F-4D97-AF65-F5344CB8AC3E}">
-        <p14:creationId xmlns:p14="http://schemas.microsoft.com/office/powerpoint/2010/main" xmlns="" val="3538037079"/>
+        <p14:creationId xmlns="" xmlns:p14="http://schemas.microsoft.com/office/powerpoint/2010/main" val="3538037079"/>
       </p:ext>
     </p:extLst>
   </p:cSld>
@@ -2686,7 +2686,7 @@
     </p:spTree>
     <p:extLst>
       <p:ext uri="{BB962C8B-B14F-4D97-AF65-F5344CB8AC3E}">
-        <p14:creationId xmlns:p14="http://schemas.microsoft.com/office/powerpoint/2010/main" xmlns="" val="2905165778"/>
+        <p14:creationId xmlns="" xmlns:p14="http://schemas.microsoft.com/office/powerpoint/2010/main" val="2905165778"/>
       </p:ext>
     </p:extLst>
   </p:cSld>
@@ -3519,7 +3519,7 @@
     </p:spTree>
     <p:extLst>
       <p:ext uri="{BB962C8B-B14F-4D97-AF65-F5344CB8AC3E}">
-        <p14:creationId xmlns:p14="http://schemas.microsoft.com/office/powerpoint/2010/main" xmlns="" val="3712731"/>
+        <p14:creationId xmlns="" xmlns:p14="http://schemas.microsoft.com/office/powerpoint/2010/main" val="3712731"/>
       </p:ext>
     </p:extLst>
   </p:cSld>
@@ -3691,7 +3691,7 @@
     </p:spTree>
     <p:extLst>
       <p:ext uri="{BB962C8B-B14F-4D97-AF65-F5344CB8AC3E}">
-        <p14:creationId xmlns:p14="http://schemas.microsoft.com/office/powerpoint/2010/main" xmlns="" val="3951405928"/>
+        <p14:creationId xmlns="" xmlns:p14="http://schemas.microsoft.com/office/powerpoint/2010/main" val="3951405928"/>
       </p:ext>
     </p:extLst>
   </p:cSld>
@@ -3873,7 +3873,7 @@
     </p:spTree>
     <p:extLst>
       <p:ext uri="{BB962C8B-B14F-4D97-AF65-F5344CB8AC3E}">
-        <p14:creationId xmlns:p14="http://schemas.microsoft.com/office/powerpoint/2010/main" xmlns="" val="2572431118"/>
+        <p14:creationId xmlns="" xmlns:p14="http://schemas.microsoft.com/office/powerpoint/2010/main" val="2572431118"/>
       </p:ext>
     </p:extLst>
   </p:cSld>
@@ -4045,7 +4045,7 @@
     </p:spTree>
     <p:extLst>
       <p:ext uri="{BB962C8B-B14F-4D97-AF65-F5344CB8AC3E}">
-        <p14:creationId xmlns:p14="http://schemas.microsoft.com/office/powerpoint/2010/main" xmlns="" val="3190397485"/>
+        <p14:creationId xmlns="" xmlns:p14="http://schemas.microsoft.com/office/powerpoint/2010/main" val="3190397485"/>
       </p:ext>
     </p:extLst>
   </p:cSld>
@@ -4304,7 +4304,7 @@
     </p:spTree>
     <p:extLst>
       <p:ext uri="{BB962C8B-B14F-4D97-AF65-F5344CB8AC3E}">
-        <p14:creationId xmlns:p14="http://schemas.microsoft.com/office/powerpoint/2010/main" xmlns="" val="1907339060"/>
+        <p14:creationId xmlns="" xmlns:p14="http://schemas.microsoft.com/office/powerpoint/2010/main" val="1907339060"/>
       </p:ext>
     </p:extLst>
   </p:cSld>
@@ -4538,7 +4538,7 @@
     </p:spTree>
     <p:extLst>
       <p:ext uri="{BB962C8B-B14F-4D97-AF65-F5344CB8AC3E}">
-        <p14:creationId xmlns:p14="http://schemas.microsoft.com/office/powerpoint/2010/main" xmlns="" val="3589843527"/>
+        <p14:creationId xmlns="" xmlns:p14="http://schemas.microsoft.com/office/powerpoint/2010/main" val="3589843527"/>
       </p:ext>
     </p:extLst>
   </p:cSld>
@@ -4933,7 +4933,7 @@
     </p:spTree>
     <p:extLst>
       <p:ext uri="{BB962C8B-B14F-4D97-AF65-F5344CB8AC3E}">
-        <p14:creationId xmlns:p14="http://schemas.microsoft.com/office/powerpoint/2010/main" xmlns="" val="1348156944"/>
+        <p14:creationId xmlns="" xmlns:p14="http://schemas.microsoft.com/office/powerpoint/2010/main" val="1348156944"/>
       </p:ext>
     </p:extLst>
   </p:cSld>
@@ -5053,7 +5053,7 @@
     </p:spTree>
     <p:extLst>
       <p:ext uri="{BB962C8B-B14F-4D97-AF65-F5344CB8AC3E}">
-        <p14:creationId xmlns:p14="http://schemas.microsoft.com/office/powerpoint/2010/main" xmlns="" val="7440479"/>
+        <p14:creationId xmlns="" xmlns:p14="http://schemas.microsoft.com/office/powerpoint/2010/main" val="7440479"/>
       </p:ext>
     </p:extLst>
   </p:cSld>
@@ -5150,7 +5150,7 @@
     </p:spTree>
     <p:extLst>
       <p:ext uri="{BB962C8B-B14F-4D97-AF65-F5344CB8AC3E}">
-        <p14:creationId xmlns:p14="http://schemas.microsoft.com/office/powerpoint/2010/main" xmlns="" val="4287353945"/>
+        <p14:creationId xmlns="" xmlns:p14="http://schemas.microsoft.com/office/powerpoint/2010/main" val="4287353945"/>
       </p:ext>
     </p:extLst>
   </p:cSld>
@@ -5425,7 +5425,7 @@
     </p:spTree>
     <p:extLst>
       <p:ext uri="{BB962C8B-B14F-4D97-AF65-F5344CB8AC3E}">
-        <p14:creationId xmlns:p14="http://schemas.microsoft.com/office/powerpoint/2010/main" xmlns="" val="3320250197"/>
+        <p14:creationId xmlns="" xmlns:p14="http://schemas.microsoft.com/office/powerpoint/2010/main" val="3320250197"/>
       </p:ext>
     </p:extLst>
   </p:cSld>
@@ -5708,7 +5708,7 @@
     </p:spTree>
     <p:extLst>
       <p:ext uri="{BB962C8B-B14F-4D97-AF65-F5344CB8AC3E}">
-        <p14:creationId xmlns:p14="http://schemas.microsoft.com/office/powerpoint/2010/main" xmlns="" val="1022564394"/>
+        <p14:creationId xmlns="" xmlns:p14="http://schemas.microsoft.com/office/powerpoint/2010/main" val="1022564394"/>
       </p:ext>
     </p:extLst>
   </p:cSld>
@@ -6022,7 +6022,7 @@
     </p:spTree>
     <p:extLst>
       <p:ext uri="{BB962C8B-B14F-4D97-AF65-F5344CB8AC3E}">
-        <p14:creationId xmlns:p14="http://schemas.microsoft.com/office/powerpoint/2010/main" xmlns="" val="3301980907"/>
+        <p14:creationId xmlns="" xmlns:p14="http://schemas.microsoft.com/office/powerpoint/2010/main" val="3301980907"/>
       </p:ext>
     </p:extLst>
   </p:cSld>
@@ -6466,7 +6466,7 @@
           <p:cNvPr id="3" name="Subtitle 2">
             <a:extLst>
               <a:ext uri="{FF2B5EF4-FFF2-40B4-BE49-F238E27FC236}">
-                <a16:creationId xmlns:a16="http://schemas.microsoft.com/office/drawing/2014/main" xmlns="" id="{5ABA27A7-F554-431F-AC36-677718D18D0D}"/>
+                <a16:creationId xmlns="" xmlns:a16="http://schemas.microsoft.com/office/drawing/2014/main" id="{5ABA27A7-F554-431F-AC36-677718D18D0D}"/>
               </a:ext>
             </a:extLst>
           </p:cNvPr>
@@ -6494,7 +6494,7 @@
           <p:cNvPr id="5" name="Picture 4">
             <a:extLst>
               <a:ext uri="{FF2B5EF4-FFF2-40B4-BE49-F238E27FC236}">
-                <a16:creationId xmlns:a16="http://schemas.microsoft.com/office/drawing/2014/main" xmlns="" id="{56BC570F-275E-4863-875C-196A7F70F273}"/>
+                <a16:creationId xmlns="" xmlns:a16="http://schemas.microsoft.com/office/drawing/2014/main" id="{56BC570F-275E-4863-875C-196A7F70F273}"/>
               </a:ext>
             </a:extLst>
           </p:cNvPr>
@@ -6507,7 +6507,7 @@
           <a:blip r:embed="rId2" cstate="print">
             <a:extLst>
               <a:ext uri="{28A0092B-C50C-407E-A947-70E740481C1C}">
-                <a14:useLocalDpi xmlns:a14="http://schemas.microsoft.com/office/drawing/2010/main" xmlns="" val="0"/>
+                <a14:useLocalDpi xmlns="" xmlns:a14="http://schemas.microsoft.com/office/drawing/2010/main" val="0"/>
               </a:ext>
             </a:extLst>
           </a:blip>
@@ -6530,7 +6530,7 @@
           <p:cNvPr id="6" name="Picture 5">
             <a:extLst>
               <a:ext uri="{FF2B5EF4-FFF2-40B4-BE49-F238E27FC236}">
-                <a16:creationId xmlns:a16="http://schemas.microsoft.com/office/drawing/2014/main" xmlns="" id="{96337E55-D478-4700-95FE-838A61730040}"/>
+                <a16:creationId xmlns="" xmlns:a16="http://schemas.microsoft.com/office/drawing/2014/main" id="{96337E55-D478-4700-95FE-838A61730040}"/>
               </a:ext>
             </a:extLst>
           </p:cNvPr>
@@ -6543,7 +6543,7 @@
           <a:blip r:embed="rId3" cstate="print">
             <a:extLst>
               <a:ext uri="{28A0092B-C50C-407E-A947-70E740481C1C}">
-                <a14:useLocalDpi xmlns:a14="http://schemas.microsoft.com/office/drawing/2010/main" xmlns="" val="0"/>
+                <a14:useLocalDpi xmlns="" xmlns:a14="http://schemas.microsoft.com/office/drawing/2010/main" val="0"/>
               </a:ext>
             </a:extLst>
           </a:blip>
@@ -6564,7 +6564,7 @@
     </p:spTree>
     <p:extLst>
       <p:ext uri="{BB962C8B-B14F-4D97-AF65-F5344CB8AC3E}">
-        <p14:creationId xmlns:p14="http://schemas.microsoft.com/office/powerpoint/2010/main" xmlns="" val="635248824"/>
+        <p14:creationId xmlns="" xmlns:p14="http://schemas.microsoft.com/office/powerpoint/2010/main" val="635248824"/>
       </p:ext>
     </p:extLst>
   </p:cSld>
@@ -6603,7 +6603,7 @@
           <p:cNvPr id="2" name="Title 1">
             <a:extLst>
               <a:ext uri="{FF2B5EF4-FFF2-40B4-BE49-F238E27FC236}">
-                <a16:creationId xmlns:a16="http://schemas.microsoft.com/office/drawing/2014/main" xmlns="" id="{FE1707A6-BD99-4ECF-BCE4-A1519B020B36}"/>
+                <a16:creationId xmlns="" xmlns:a16="http://schemas.microsoft.com/office/drawing/2014/main" id="{FE1707A6-BD99-4ECF-BCE4-A1519B020B36}"/>
               </a:ext>
             </a:extLst>
           </p:cNvPr>
@@ -6637,7 +6637,7 @@
           <p:cNvPr id="5" name="Picture 4">
             <a:extLst>
               <a:ext uri="{FF2B5EF4-FFF2-40B4-BE49-F238E27FC236}">
-                <a16:creationId xmlns:a16="http://schemas.microsoft.com/office/drawing/2014/main" xmlns="" id="{55ED534F-A991-4E89-BFA6-62449C870B20}"/>
+                <a16:creationId xmlns="" xmlns:a16="http://schemas.microsoft.com/office/drawing/2014/main" id="{55ED534F-A991-4E89-BFA6-62449C870B20}"/>
               </a:ext>
             </a:extLst>
           </p:cNvPr>
@@ -6650,7 +6650,7 @@
           <a:blip r:embed="rId2" cstate="print">
             <a:extLst>
               <a:ext uri="{28A0092B-C50C-407E-A947-70E740481C1C}">
-                <a14:useLocalDpi xmlns:a14="http://schemas.microsoft.com/office/drawing/2010/main" xmlns="" val="0"/>
+                <a14:useLocalDpi xmlns="" xmlns:a14="http://schemas.microsoft.com/office/drawing/2010/main" val="0"/>
               </a:ext>
             </a:extLst>
           </a:blip>
@@ -6673,7 +6673,7 @@
           <p:cNvPr id="7" name="Picture 6">
             <a:extLst>
               <a:ext uri="{FF2B5EF4-FFF2-40B4-BE49-F238E27FC236}">
-                <a16:creationId xmlns:a16="http://schemas.microsoft.com/office/drawing/2014/main" xmlns="" id="{BBB2C33A-3D86-494C-831C-49E185BA475E}"/>
+                <a16:creationId xmlns="" xmlns:a16="http://schemas.microsoft.com/office/drawing/2014/main" id="{BBB2C33A-3D86-494C-831C-49E185BA475E}"/>
               </a:ext>
             </a:extLst>
           </p:cNvPr>
@@ -6686,7 +6686,7 @@
           <a:blip r:embed="rId3" cstate="print">
             <a:extLst>
               <a:ext uri="{28A0092B-C50C-407E-A947-70E740481C1C}">
-                <a14:useLocalDpi xmlns:a14="http://schemas.microsoft.com/office/drawing/2010/main" xmlns="" val="0"/>
+                <a14:useLocalDpi xmlns="" xmlns:a14="http://schemas.microsoft.com/office/drawing/2010/main" val="0"/>
               </a:ext>
             </a:extLst>
           </a:blip>
@@ -6709,7 +6709,7 @@
           <p:cNvPr id="8" name="TextBox 7">
             <a:extLst>
               <a:ext uri="{FF2B5EF4-FFF2-40B4-BE49-F238E27FC236}">
-                <a16:creationId xmlns:a16="http://schemas.microsoft.com/office/drawing/2014/main" xmlns="" id="{046F16AB-849B-4477-A6EB-C6E5431CA61C}"/>
+                <a16:creationId xmlns="" xmlns:a16="http://schemas.microsoft.com/office/drawing/2014/main" id="{046F16AB-849B-4477-A6EB-C6E5431CA61C}"/>
               </a:ext>
             </a:extLst>
           </p:cNvPr>
@@ -6760,7 +6760,7 @@
           <p:cNvPr id="10" name="Picture 9">
             <a:extLst>
               <a:ext uri="{FF2B5EF4-FFF2-40B4-BE49-F238E27FC236}">
-                <a16:creationId xmlns:a16="http://schemas.microsoft.com/office/drawing/2014/main" xmlns="" id="{4E596BB1-81C0-4A9D-AF89-5E264D6D787C}"/>
+                <a16:creationId xmlns="" xmlns:a16="http://schemas.microsoft.com/office/drawing/2014/main" id="{4E596BB1-81C0-4A9D-AF89-5E264D6D787C}"/>
               </a:ext>
             </a:extLst>
           </p:cNvPr>
@@ -6773,7 +6773,7 @@
           <a:blip r:embed="rId4" cstate="print">
             <a:extLst>
               <a:ext uri="{28A0092B-C50C-407E-A947-70E740481C1C}">
-                <a14:useLocalDpi xmlns:a14="http://schemas.microsoft.com/office/drawing/2010/main" xmlns="" val="0"/>
+                <a14:useLocalDpi xmlns="" xmlns:a14="http://schemas.microsoft.com/office/drawing/2010/main" val="0"/>
               </a:ext>
             </a:extLst>
           </a:blip>
@@ -6794,7 +6794,7 @@
     </p:spTree>
     <p:extLst>
       <p:ext uri="{BB962C8B-B14F-4D97-AF65-F5344CB8AC3E}">
-        <p14:creationId xmlns:p14="http://schemas.microsoft.com/office/powerpoint/2010/main" xmlns="" val="2755524296"/>
+        <p14:creationId xmlns="" xmlns:p14="http://schemas.microsoft.com/office/powerpoint/2010/main" val="2755524296"/>
       </p:ext>
     </p:extLst>
   </p:cSld>
@@ -6833,7 +6833,7 @@
           <p:cNvPr id="2" name="Title 1">
             <a:extLst>
               <a:ext uri="{FF2B5EF4-FFF2-40B4-BE49-F238E27FC236}">
-                <a16:creationId xmlns:a16="http://schemas.microsoft.com/office/drawing/2014/main" xmlns="" id="{E0F7E4AF-F7ED-4B09-918E-8A07ACAEE2B9}"/>
+                <a16:creationId xmlns="" xmlns:a16="http://schemas.microsoft.com/office/drawing/2014/main" id="{E0F7E4AF-F7ED-4B09-918E-8A07ACAEE2B9}"/>
               </a:ext>
             </a:extLst>
           </p:cNvPr>
@@ -6861,7 +6861,7 @@
           <p:cNvPr id="3" name="Content Placeholder 2">
             <a:extLst>
               <a:ext uri="{FF2B5EF4-FFF2-40B4-BE49-F238E27FC236}">
-                <a16:creationId xmlns:a16="http://schemas.microsoft.com/office/drawing/2014/main" xmlns="" id="{D8CA3B48-BFC3-4CE8-ABA5-33DE2BF3D214}"/>
+                <a16:creationId xmlns="" xmlns:a16="http://schemas.microsoft.com/office/drawing/2014/main" id="{D8CA3B48-BFC3-4CE8-ABA5-33DE2BF3D214}"/>
               </a:ext>
             </a:extLst>
           </p:cNvPr>
@@ -6907,7 +6907,7 @@
           <p:cNvPr id="4" name="Picture 3">
             <a:extLst>
               <a:ext uri="{FF2B5EF4-FFF2-40B4-BE49-F238E27FC236}">
-                <a16:creationId xmlns:a16="http://schemas.microsoft.com/office/drawing/2014/main" xmlns="" id="{06FB59FE-B52F-4C2C-9438-8BA2BF049E33}"/>
+                <a16:creationId xmlns="" xmlns:a16="http://schemas.microsoft.com/office/drawing/2014/main" id="{06FB59FE-B52F-4C2C-9438-8BA2BF049E33}"/>
               </a:ext>
             </a:extLst>
           </p:cNvPr>
@@ -6920,7 +6920,7 @@
           <a:blip r:embed="rId2" cstate="print">
             <a:extLst>
               <a:ext uri="{28A0092B-C50C-407E-A947-70E740481C1C}">
-                <a14:useLocalDpi xmlns:a14="http://schemas.microsoft.com/office/drawing/2010/main" xmlns="" val="0"/>
+                <a14:useLocalDpi xmlns="" xmlns:a14="http://schemas.microsoft.com/office/drawing/2010/main" val="0"/>
               </a:ext>
             </a:extLst>
           </a:blip>
@@ -6941,7 +6941,7 @@
     </p:spTree>
     <p:extLst>
       <p:ext uri="{BB962C8B-B14F-4D97-AF65-F5344CB8AC3E}">
-        <p14:creationId xmlns:p14="http://schemas.microsoft.com/office/powerpoint/2010/main" xmlns="" val="1489102986"/>
+        <p14:creationId xmlns="" xmlns:p14="http://schemas.microsoft.com/office/powerpoint/2010/main" val="1489102986"/>
       </p:ext>
     </p:extLst>
   </p:cSld>
@@ -6980,7 +6980,7 @@
           <p:cNvPr id="2" name="Title 1">
             <a:extLst>
               <a:ext uri="{FF2B5EF4-FFF2-40B4-BE49-F238E27FC236}">
-                <a16:creationId xmlns:a16="http://schemas.microsoft.com/office/drawing/2014/main" xmlns="" id="{D043D610-4505-47F9-8744-878655395FD3}"/>
+                <a16:creationId xmlns="" xmlns:a16="http://schemas.microsoft.com/office/drawing/2014/main" id="{D043D610-4505-47F9-8744-878655395FD3}"/>
               </a:ext>
             </a:extLst>
           </p:cNvPr>
@@ -7009,7 +7009,7 @@
           <p:cNvPr id="3" name="Content Placeholder 2">
             <a:extLst>
               <a:ext uri="{FF2B5EF4-FFF2-40B4-BE49-F238E27FC236}">
-                <a16:creationId xmlns:a16="http://schemas.microsoft.com/office/drawing/2014/main" xmlns="" id="{11AD7357-80CD-434C-A730-12B8A62A81E7}"/>
+                <a16:creationId xmlns="" xmlns:a16="http://schemas.microsoft.com/office/drawing/2014/main" id="{11AD7357-80CD-434C-A730-12B8A62A81E7}"/>
               </a:ext>
             </a:extLst>
           </p:cNvPr>
@@ -7052,7 +7052,7 @@
           <p:cNvPr id="4" name="Picture 3">
             <a:extLst>
               <a:ext uri="{FF2B5EF4-FFF2-40B4-BE49-F238E27FC236}">
-                <a16:creationId xmlns:a16="http://schemas.microsoft.com/office/drawing/2014/main" xmlns="" id="{90BB4250-BB84-4AC9-883A-0733A04A65D5}"/>
+                <a16:creationId xmlns="" xmlns:a16="http://schemas.microsoft.com/office/drawing/2014/main" id="{90BB4250-BB84-4AC9-883A-0733A04A65D5}"/>
               </a:ext>
             </a:extLst>
           </p:cNvPr>
@@ -7065,7 +7065,7 @@
           <a:blip r:embed="rId2" cstate="print">
             <a:extLst>
               <a:ext uri="{28A0092B-C50C-407E-A947-70E740481C1C}">
-                <a14:useLocalDpi xmlns:a14="http://schemas.microsoft.com/office/drawing/2010/main" xmlns="" val="0"/>
+                <a14:useLocalDpi xmlns="" xmlns:a14="http://schemas.microsoft.com/office/drawing/2010/main" val="0"/>
               </a:ext>
             </a:extLst>
           </a:blip>
@@ -7086,7 +7086,7 @@
     </p:spTree>
     <p:extLst>
       <p:ext uri="{BB962C8B-B14F-4D97-AF65-F5344CB8AC3E}">
-        <p14:creationId xmlns:p14="http://schemas.microsoft.com/office/powerpoint/2010/main" xmlns="" val="2145066065"/>
+        <p14:creationId xmlns="" xmlns:p14="http://schemas.microsoft.com/office/powerpoint/2010/main" val="2145066065"/>
       </p:ext>
     </p:extLst>
   </p:cSld>
@@ -7125,7 +7125,7 @@
           <p:cNvPr id="2" name="Title 1">
             <a:extLst>
               <a:ext uri="{FF2B5EF4-FFF2-40B4-BE49-F238E27FC236}">
-                <a16:creationId xmlns:a16="http://schemas.microsoft.com/office/drawing/2014/main" xmlns="" id="{3CE6AB90-DF75-472E-AD77-3775F01A98B3}"/>
+                <a16:creationId xmlns="" xmlns:a16="http://schemas.microsoft.com/office/drawing/2014/main" id="{3CE6AB90-DF75-472E-AD77-3775F01A98B3}"/>
               </a:ext>
             </a:extLst>
           </p:cNvPr>
@@ -7154,7 +7154,7 @@
           <p:cNvPr id="3" name="Content Placeholder 2">
             <a:extLst>
               <a:ext uri="{FF2B5EF4-FFF2-40B4-BE49-F238E27FC236}">
-                <a16:creationId xmlns:a16="http://schemas.microsoft.com/office/drawing/2014/main" xmlns="" id="{69EA60D7-4061-409A-8161-30DF4AA1AE8A}"/>
+                <a16:creationId xmlns="" xmlns:a16="http://schemas.microsoft.com/office/drawing/2014/main" id="{69EA60D7-4061-409A-8161-30DF4AA1AE8A}"/>
               </a:ext>
             </a:extLst>
           </p:cNvPr>
@@ -7230,7 +7230,7 @@
           <p:cNvPr id="4" name="Picture 3">
             <a:extLst>
               <a:ext uri="{FF2B5EF4-FFF2-40B4-BE49-F238E27FC236}">
-                <a16:creationId xmlns:a16="http://schemas.microsoft.com/office/drawing/2014/main" xmlns="" id="{741B2568-12CC-4C2F-B04D-B5FDE1AFA72D}"/>
+                <a16:creationId xmlns="" xmlns:a16="http://schemas.microsoft.com/office/drawing/2014/main" id="{741B2568-12CC-4C2F-B04D-B5FDE1AFA72D}"/>
               </a:ext>
             </a:extLst>
           </p:cNvPr>
@@ -7243,7 +7243,7 @@
           <a:blip r:embed="rId3" cstate="print">
             <a:extLst>
               <a:ext uri="{28A0092B-C50C-407E-A947-70E740481C1C}">
-                <a14:useLocalDpi xmlns:a14="http://schemas.microsoft.com/office/drawing/2010/main" xmlns="" val="0"/>
+                <a14:useLocalDpi xmlns="" xmlns:a14="http://schemas.microsoft.com/office/drawing/2010/main" val="0"/>
               </a:ext>
             </a:extLst>
           </a:blip>
@@ -7266,7 +7266,7 @@
           <p:cNvPr id="5" name="Content Placeholder 2">
             <a:extLst>
               <a:ext uri="{FF2B5EF4-FFF2-40B4-BE49-F238E27FC236}">
-                <a16:creationId xmlns:a16="http://schemas.microsoft.com/office/drawing/2014/main" xmlns="" id="{188A2E33-672F-496D-9FED-A7EDEB426E8B}"/>
+                <a16:creationId xmlns="" xmlns:a16="http://schemas.microsoft.com/office/drawing/2014/main" id="{188A2E33-672F-496D-9FED-A7EDEB426E8B}"/>
               </a:ext>
             </a:extLst>
           </p:cNvPr>
@@ -7598,7 +7598,7 @@
           <p:cNvPr id="7" name="Picture 6">
             <a:extLst>
               <a:ext uri="{FF2B5EF4-FFF2-40B4-BE49-F238E27FC236}">
-                <a16:creationId xmlns:a16="http://schemas.microsoft.com/office/drawing/2014/main" xmlns="" id="{7194B06A-984C-4517-A89C-2217CCE7E6D8}"/>
+                <a16:creationId xmlns="" xmlns:a16="http://schemas.microsoft.com/office/drawing/2014/main" id="{7194B06A-984C-4517-A89C-2217CCE7E6D8}"/>
               </a:ext>
             </a:extLst>
           </p:cNvPr>
@@ -7611,7 +7611,7 @@
           <a:blip r:embed="rId4" cstate="print">
             <a:extLst>
               <a:ext uri="{28A0092B-C50C-407E-A947-70E740481C1C}">
-                <a14:useLocalDpi xmlns:a14="http://schemas.microsoft.com/office/drawing/2010/main" xmlns="" val="0"/>
+                <a14:useLocalDpi xmlns="" xmlns:a14="http://schemas.microsoft.com/office/drawing/2010/main" val="0"/>
               </a:ext>
             </a:extLst>
           </a:blip>
@@ -7655,7 +7655,7 @@
     </p:spTree>
     <p:extLst>
       <p:ext uri="{BB962C8B-B14F-4D97-AF65-F5344CB8AC3E}">
-        <p14:creationId xmlns:p14="http://schemas.microsoft.com/office/powerpoint/2010/main" xmlns="" val="3717006473"/>
+        <p14:creationId xmlns="" xmlns:p14="http://schemas.microsoft.com/office/powerpoint/2010/main" val="3717006473"/>
       </p:ext>
     </p:extLst>
   </p:cSld>
@@ -7689,12 +7689,36 @@
           <a:chExt cx="0" cy="0"/>
         </a:xfrm>
       </p:grpSpPr>
+      <p:pic>
+        <p:nvPicPr>
+          <p:cNvPr id="10" name="Picture 9" descr="GameLoopPNG.png"/>
+          <p:cNvPicPr>
+            <a:picLocks noChangeAspect="1"/>
+          </p:cNvPicPr>
+          <p:nvPr/>
+        </p:nvPicPr>
+        <p:blipFill>
+          <a:blip r:embed="rId3" cstate="print"/>
+          <a:stretch>
+            <a:fillRect/>
+          </a:stretch>
+        </p:blipFill>
+        <p:spPr>
+          <a:xfrm>
+            <a:off x="5700156" y="591787"/>
+            <a:ext cx="6266213" cy="6266213"/>
+          </a:xfrm>
+          <a:prstGeom prst="rect">
+            <a:avLst/>
+          </a:prstGeom>
+        </p:spPr>
+      </p:pic>
       <p:sp>
         <p:nvSpPr>
           <p:cNvPr id="8" name="Oval 7">
             <a:extLst>
               <a:ext uri="{FF2B5EF4-FFF2-40B4-BE49-F238E27FC236}">
-                <a16:creationId xmlns:a16="http://schemas.microsoft.com/office/drawing/2014/main" xmlns="" id="{552A35DA-0C5D-44FA-9872-AC54B0A3A4D7}"/>
+                <a16:creationId xmlns="" xmlns:a16="http://schemas.microsoft.com/office/drawing/2014/main" id="{552A35DA-0C5D-44FA-9872-AC54B0A3A4D7}"/>
               </a:ext>
             </a:extLst>
           </p:cNvPr>
@@ -7703,7 +7727,7 @@
         </p:nvSpPr>
         <p:spPr>
           <a:xfrm>
-            <a:off x="9024026" y="4601183"/>
+            <a:off x="8549013" y="3033639"/>
             <a:ext cx="262647" cy="272374"/>
           </a:xfrm>
           <a:prstGeom prst="ellipse">
@@ -7740,7 +7764,7 @@
           <p:cNvPr id="2" name="Title 1">
             <a:extLst>
               <a:ext uri="{FF2B5EF4-FFF2-40B4-BE49-F238E27FC236}">
-                <a16:creationId xmlns:a16="http://schemas.microsoft.com/office/drawing/2014/main" xmlns="" id="{35ACCF0E-D6FE-421E-BA99-91383EEB7C52}"/>
+                <a16:creationId xmlns="" xmlns:a16="http://schemas.microsoft.com/office/drawing/2014/main" id="{35ACCF0E-D6FE-421E-BA99-91383EEB7C52}"/>
               </a:ext>
             </a:extLst>
           </p:cNvPr>
@@ -7760,39 +7784,6 @@
             <a:r>
               <a:rPr lang="en-GB" dirty="0"/>
               <a:t>What do they do?</a:t>
-            </a:r>
-          </a:p>
-        </p:txBody>
-      </p:sp>
-      <p:sp>
-        <p:nvSpPr>
-          <p:cNvPr id="3" name="Content Placeholder 2">
-            <a:extLst>
-              <a:ext uri="{FF2B5EF4-FFF2-40B4-BE49-F238E27FC236}">
-                <a16:creationId xmlns:a16="http://schemas.microsoft.com/office/drawing/2014/main" xmlns="" id="{F6EF4FD1-9028-4BA5-AA0F-321E6244028D}"/>
-              </a:ext>
-            </a:extLst>
-          </p:cNvPr>
-          <p:cNvSpPr>
-            <a:spLocks noGrp="1"/>
-          </p:cNvSpPr>
-          <p:nvPr>
-            <p:ph idx="1"/>
-          </p:nvPr>
-        </p:nvSpPr>
-        <p:spPr>
-          <a:xfrm>
-            <a:off x="1120000" y="1825625"/>
-            <a:ext cx="10233800" cy="2553428"/>
-          </a:xfrm>
-        </p:spPr>
-        <p:txBody>
-          <a:bodyPr/>
-          <a:lstStyle/>
-          <a:p>
-            <a:r>
-              <a:rPr lang="en-GB" dirty="0"/>
-              <a:t>(PICTURES EXPLAINING CORE GAME LOOP – REFER TO SPEAKER NOTES)</a:t>
             </a:r>
           </a:p>
         </p:txBody>
@@ -7802,7 +7793,7 @@
           <p:cNvPr id="4" name="Picture 3">
             <a:extLst>
               <a:ext uri="{FF2B5EF4-FFF2-40B4-BE49-F238E27FC236}">
-                <a16:creationId xmlns:a16="http://schemas.microsoft.com/office/drawing/2014/main" xmlns="" id="{89F1976A-F61B-4422-9B67-C0F001252090}"/>
+                <a16:creationId xmlns="" xmlns:a16="http://schemas.microsoft.com/office/drawing/2014/main" id="{89F1976A-F61B-4422-9B67-C0F001252090}"/>
               </a:ext>
             </a:extLst>
           </p:cNvPr>
@@ -7812,10 +7803,10 @@
           <p:nvPr/>
         </p:nvPicPr>
         <p:blipFill>
-          <a:blip r:embed="rId3" cstate="print">
+          <a:blip r:embed="rId4" cstate="print">
             <a:extLst>
               <a:ext uri="{28A0092B-C50C-407E-A947-70E740481C1C}">
-                <a14:useLocalDpi xmlns:a14="http://schemas.microsoft.com/office/drawing/2010/main" xmlns="" val="0"/>
+                <a14:useLocalDpi xmlns="" xmlns:a14="http://schemas.microsoft.com/office/drawing/2010/main" val="0"/>
               </a:ext>
             </a:extLst>
           </a:blip>
@@ -7838,7 +7829,7 @@
           <p:cNvPr id="5" name="Content Placeholder 2">
             <a:extLst>
               <a:ext uri="{FF2B5EF4-FFF2-40B4-BE49-F238E27FC236}">
-                <a16:creationId xmlns:a16="http://schemas.microsoft.com/office/drawing/2014/main" xmlns="" id="{85BD8BDC-A299-4E5C-9207-6B1ABA39F3E9}"/>
+                <a16:creationId xmlns="" xmlns:a16="http://schemas.microsoft.com/office/drawing/2014/main" id="{85BD8BDC-A299-4E5C-9207-6B1ABA39F3E9}"/>
               </a:ext>
             </a:extLst>
           </p:cNvPr>
@@ -7849,7 +7840,7 @@
         </p:nvSpPr>
         <p:spPr>
           <a:xfrm>
-            <a:off x="1120000" y="4251441"/>
+            <a:off x="217475" y="4405820"/>
             <a:ext cx="10233800" cy="2283582"/>
           </a:xfrm>
           <a:prstGeom prst="rect">
@@ -8160,7 +8151,7 @@
           <p:cNvPr id="7" name="Picture 6">
             <a:extLst>
               <a:ext uri="{FF2B5EF4-FFF2-40B4-BE49-F238E27FC236}">
-                <a16:creationId xmlns:a16="http://schemas.microsoft.com/office/drawing/2014/main" xmlns="" id="{51BCDF80-65A3-4CB9-9B75-EAC219AA4963}"/>
+                <a16:creationId xmlns="" xmlns:a16="http://schemas.microsoft.com/office/drawing/2014/main" id="{51BCDF80-65A3-4CB9-9B75-EAC219AA4963}"/>
               </a:ext>
             </a:extLst>
           </p:cNvPr>
@@ -8170,11 +8161,11 @@
           <p:nvPr/>
         </p:nvPicPr>
         <p:blipFill>
-          <a:blip r:embed="rId4" cstate="print">
+          <a:blip r:embed="rId5" cstate="print">
             <a:extLst>
               <a:ext uri="{BEBA8EAE-BF5A-486C-A8C5-ECC9F3942E4B}">
-                <a14:imgProps xmlns:a14="http://schemas.microsoft.com/office/drawing/2010/main" xmlns="">
-                  <a14:imgLayer r:embed="rId5">
+                <a14:imgProps xmlns="" xmlns:a14="http://schemas.microsoft.com/office/drawing/2010/main">
+                  <a14:imgLayer r:embed="rId6">
                     <a14:imgEffect>
                       <a14:backgroundRemoval t="10000" b="90000" l="10000" r="90000"/>
                     </a14:imgEffect>
@@ -8182,7 +8173,7 @@
                 </a14:imgProps>
               </a:ext>
               <a:ext uri="{28A0092B-C50C-407E-A947-70E740481C1C}">
-                <a14:useLocalDpi xmlns:a14="http://schemas.microsoft.com/office/drawing/2010/main" xmlns="" val="0"/>
+                <a14:useLocalDpi xmlns="" xmlns:a14="http://schemas.microsoft.com/office/drawing/2010/main" val="0"/>
               </a:ext>
             </a:extLst>
           </a:blip>
@@ -8192,7 +8183,7 @@
         </p:blipFill>
         <p:spPr>
           <a:xfrm>
-            <a:off x="7857923" y="3541336"/>
+            <a:off x="7371034" y="1926292"/>
             <a:ext cx="2857500" cy="2857500"/>
           </a:xfrm>
           <a:prstGeom prst="rect">
@@ -8203,7 +8194,7 @@
     </p:spTree>
     <p:extLst>
       <p:ext uri="{BB962C8B-B14F-4D97-AF65-F5344CB8AC3E}">
-        <p14:creationId xmlns:p14="http://schemas.microsoft.com/office/powerpoint/2010/main" xmlns="" val="2716024304"/>
+        <p14:creationId xmlns="" xmlns:p14="http://schemas.microsoft.com/office/powerpoint/2010/main" val="2716024304"/>
       </p:ext>
     </p:extLst>
   </p:cSld>
@@ -8242,7 +8233,7 @@
           <p:cNvPr id="2" name="Title 1">
             <a:extLst>
               <a:ext uri="{FF2B5EF4-FFF2-40B4-BE49-F238E27FC236}">
-                <a16:creationId xmlns:a16="http://schemas.microsoft.com/office/drawing/2014/main" xmlns="" id="{1D8718C7-CAD2-4A55-8CED-01B5365C1260}"/>
+                <a16:creationId xmlns="" xmlns:a16="http://schemas.microsoft.com/office/drawing/2014/main" id="{1D8718C7-CAD2-4A55-8CED-01B5365C1260}"/>
               </a:ext>
             </a:extLst>
           </p:cNvPr>
@@ -8271,7 +8262,7 @@
           <p:cNvPr id="6" name="Content Placeholder 5">
             <a:extLst>
               <a:ext uri="{FF2B5EF4-FFF2-40B4-BE49-F238E27FC236}">
-                <a16:creationId xmlns:a16="http://schemas.microsoft.com/office/drawing/2014/main" xmlns="" id="{DAE12B24-F807-495D-90F7-62B7790B187B}"/>
+                <a16:creationId xmlns="" xmlns:a16="http://schemas.microsoft.com/office/drawing/2014/main" id="{DAE12B24-F807-495D-90F7-62B7790B187B}"/>
               </a:ext>
             </a:extLst>
           </p:cNvPr>
@@ -8286,7 +8277,7 @@
           <a:blip r:embed="rId2" cstate="print">
             <a:extLst>
               <a:ext uri="{28A0092B-C50C-407E-A947-70E740481C1C}">
-                <a14:useLocalDpi xmlns:a14="http://schemas.microsoft.com/office/drawing/2010/main" xmlns="" val="0"/>
+                <a14:useLocalDpi xmlns="" xmlns:a14="http://schemas.microsoft.com/office/drawing/2010/main" val="0"/>
               </a:ext>
             </a:extLst>
           </a:blip>
@@ -8306,7 +8297,7 @@
           <p:cNvPr id="4" name="Picture 3">
             <a:extLst>
               <a:ext uri="{FF2B5EF4-FFF2-40B4-BE49-F238E27FC236}">
-                <a16:creationId xmlns:a16="http://schemas.microsoft.com/office/drawing/2014/main" xmlns="" id="{08DD0372-F361-4655-AFE7-2855BB164970}"/>
+                <a16:creationId xmlns="" xmlns:a16="http://schemas.microsoft.com/office/drawing/2014/main" id="{08DD0372-F361-4655-AFE7-2855BB164970}"/>
               </a:ext>
             </a:extLst>
           </p:cNvPr>
@@ -8319,7 +8310,7 @@
           <a:blip r:embed="rId3" cstate="print">
             <a:extLst>
               <a:ext uri="{28A0092B-C50C-407E-A947-70E740481C1C}">
-                <a14:useLocalDpi xmlns:a14="http://schemas.microsoft.com/office/drawing/2010/main" xmlns="" val="0"/>
+                <a14:useLocalDpi xmlns="" xmlns:a14="http://schemas.microsoft.com/office/drawing/2010/main" val="0"/>
               </a:ext>
             </a:extLst>
           </a:blip>
@@ -8342,7 +8333,7 @@
           <p:cNvPr id="8" name="Picture 7">
             <a:extLst>
               <a:ext uri="{FF2B5EF4-FFF2-40B4-BE49-F238E27FC236}">
-                <a16:creationId xmlns:a16="http://schemas.microsoft.com/office/drawing/2014/main" xmlns="" id="{FA4961E7-DDCE-492B-9E32-EA4461B5A637}"/>
+                <a16:creationId xmlns="" xmlns:a16="http://schemas.microsoft.com/office/drawing/2014/main" id="{FA4961E7-DDCE-492B-9E32-EA4461B5A637}"/>
               </a:ext>
             </a:extLst>
           </p:cNvPr>
@@ -8355,7 +8346,7 @@
           <a:blip r:embed="rId4" cstate="print">
             <a:extLst>
               <a:ext uri="{28A0092B-C50C-407E-A947-70E740481C1C}">
-                <a14:useLocalDpi xmlns:a14="http://schemas.microsoft.com/office/drawing/2010/main" xmlns="" val="0"/>
+                <a14:useLocalDpi xmlns="" xmlns:a14="http://schemas.microsoft.com/office/drawing/2010/main" val="0"/>
               </a:ext>
             </a:extLst>
           </a:blip>
@@ -8378,7 +8369,7 @@
           <p:cNvPr id="10" name="Picture 9">
             <a:extLst>
               <a:ext uri="{FF2B5EF4-FFF2-40B4-BE49-F238E27FC236}">
-                <a16:creationId xmlns:a16="http://schemas.microsoft.com/office/drawing/2014/main" xmlns="" id="{597A64EE-AE78-46DC-B8C0-26A00BA2824B}"/>
+                <a16:creationId xmlns="" xmlns:a16="http://schemas.microsoft.com/office/drawing/2014/main" id="{597A64EE-AE78-46DC-B8C0-26A00BA2824B}"/>
               </a:ext>
             </a:extLst>
           </p:cNvPr>
@@ -8391,7 +8382,7 @@
           <a:blip r:embed="rId5" cstate="print">
             <a:extLst>
               <a:ext uri="{28A0092B-C50C-407E-A947-70E740481C1C}">
-                <a14:useLocalDpi xmlns:a14="http://schemas.microsoft.com/office/drawing/2010/main" xmlns="" val="0"/>
+                <a14:useLocalDpi xmlns="" xmlns:a14="http://schemas.microsoft.com/office/drawing/2010/main" val="0"/>
               </a:ext>
             </a:extLst>
           </a:blip>
@@ -8446,7 +8437,7 @@
           <p:cNvPr id="13" name="Straight Arrow Connector 12">
             <a:extLst>
               <a:ext uri="{FF2B5EF4-FFF2-40B4-BE49-F238E27FC236}">
-                <a16:creationId xmlns:a16="http://schemas.microsoft.com/office/drawing/2014/main" xmlns="" id="{516D49CA-B0F7-4E22-BD32-A5CDD1926868}"/>
+                <a16:creationId xmlns="" xmlns:a16="http://schemas.microsoft.com/office/drawing/2014/main" id="{516D49CA-B0F7-4E22-BD32-A5CDD1926868}"/>
               </a:ext>
             </a:extLst>
           </p:cNvPr>
@@ -8485,7 +8476,7 @@
     </p:spTree>
     <p:extLst>
       <p:ext uri="{BB962C8B-B14F-4D97-AF65-F5344CB8AC3E}">
-        <p14:creationId xmlns:p14="http://schemas.microsoft.com/office/powerpoint/2010/main" xmlns="" val="1935535134"/>
+        <p14:creationId xmlns="" xmlns:p14="http://schemas.microsoft.com/office/powerpoint/2010/main" val="1935535134"/>
       </p:ext>
     </p:extLst>
   </p:cSld>
@@ -8524,7 +8515,7 @@
           <p:cNvPr id="2" name="Title 1">
             <a:extLst>
               <a:ext uri="{FF2B5EF4-FFF2-40B4-BE49-F238E27FC236}">
-                <a16:creationId xmlns:a16="http://schemas.microsoft.com/office/drawing/2014/main" xmlns="" id="{22185D28-3B81-4B35-B6F7-3DCAF5E34A9E}"/>
+                <a16:creationId xmlns="" xmlns:a16="http://schemas.microsoft.com/office/drawing/2014/main" id="{22185D28-3B81-4B35-B6F7-3DCAF5E34A9E}"/>
               </a:ext>
             </a:extLst>
           </p:cNvPr>
@@ -8553,7 +8544,7 @@
           <p:cNvPr id="3" name="Content Placeholder 2">
             <a:extLst>
               <a:ext uri="{FF2B5EF4-FFF2-40B4-BE49-F238E27FC236}">
-                <a16:creationId xmlns:a16="http://schemas.microsoft.com/office/drawing/2014/main" xmlns="" id="{7AC224F6-28B1-4A42-864A-2ED9DA883E13}"/>
+                <a16:creationId xmlns="" xmlns:a16="http://schemas.microsoft.com/office/drawing/2014/main" id="{7AC224F6-28B1-4A42-864A-2ED9DA883E13}"/>
               </a:ext>
             </a:extLst>
           </p:cNvPr>
@@ -8578,7 +8569,7 @@
           <p:cNvPr id="4" name="Picture 3">
             <a:extLst>
               <a:ext uri="{FF2B5EF4-FFF2-40B4-BE49-F238E27FC236}">
-                <a16:creationId xmlns:a16="http://schemas.microsoft.com/office/drawing/2014/main" xmlns="" id="{8A06DB27-579B-48E2-ACEB-09CAC9579B5E}"/>
+                <a16:creationId xmlns="" xmlns:a16="http://schemas.microsoft.com/office/drawing/2014/main" id="{8A06DB27-579B-48E2-ACEB-09CAC9579B5E}"/>
               </a:ext>
             </a:extLst>
           </p:cNvPr>
@@ -8591,7 +8582,7 @@
           <a:blip r:embed="rId3" cstate="print">
             <a:extLst>
               <a:ext uri="{28A0092B-C50C-407E-A947-70E740481C1C}">
-                <a14:useLocalDpi xmlns:a14="http://schemas.microsoft.com/office/drawing/2010/main" xmlns="" val="0"/>
+                <a14:useLocalDpi xmlns="" xmlns:a14="http://schemas.microsoft.com/office/drawing/2010/main" val="0"/>
               </a:ext>
             </a:extLst>
           </a:blip>
@@ -8640,7 +8631,7 @@
     </p:spTree>
     <p:extLst>
       <p:ext uri="{BB962C8B-B14F-4D97-AF65-F5344CB8AC3E}">
-        <p14:creationId xmlns:p14="http://schemas.microsoft.com/office/powerpoint/2010/main" xmlns="" val="1929326837"/>
+        <p14:creationId xmlns="" xmlns:p14="http://schemas.microsoft.com/office/powerpoint/2010/main" val="1929326837"/>
       </p:ext>
     </p:extLst>
   </p:cSld>
@@ -8822,7 +8813,7 @@
           <p:cNvPr id="2" name="Title 1">
             <a:extLst>
               <a:ext uri="{FF2B5EF4-FFF2-40B4-BE49-F238E27FC236}">
-                <a16:creationId xmlns:a16="http://schemas.microsoft.com/office/drawing/2014/main" xmlns="" id="{BE75E444-1504-4EB6-99F0-27C062A2514B}"/>
+                <a16:creationId xmlns="" xmlns:a16="http://schemas.microsoft.com/office/drawing/2014/main" id="{BE75E444-1504-4EB6-99F0-27C062A2514B}"/>
               </a:ext>
             </a:extLst>
           </p:cNvPr>
@@ -8851,7 +8842,7 @@
           <p:cNvPr id="3" name="Content Placeholder 2">
             <a:extLst>
               <a:ext uri="{FF2B5EF4-FFF2-40B4-BE49-F238E27FC236}">
-                <a16:creationId xmlns:a16="http://schemas.microsoft.com/office/drawing/2014/main" xmlns="" id="{B9C2A57B-51BB-44D6-A6D0-2EF8F6F37310}"/>
+                <a16:creationId xmlns="" xmlns:a16="http://schemas.microsoft.com/office/drawing/2014/main" id="{B9C2A57B-51BB-44D6-A6D0-2EF8F6F37310}"/>
               </a:ext>
             </a:extLst>
           </p:cNvPr>
@@ -8910,7 +8901,7 @@
           <p:cNvPr id="4" name="Picture 3">
             <a:extLst>
               <a:ext uri="{FF2B5EF4-FFF2-40B4-BE49-F238E27FC236}">
-                <a16:creationId xmlns:a16="http://schemas.microsoft.com/office/drawing/2014/main" xmlns="" id="{1B9EA258-D179-4AF5-91C9-08A033D12895}"/>
+                <a16:creationId xmlns="" xmlns:a16="http://schemas.microsoft.com/office/drawing/2014/main" id="{1B9EA258-D179-4AF5-91C9-08A033D12895}"/>
               </a:ext>
             </a:extLst>
           </p:cNvPr>
@@ -8923,7 +8914,7 @@
           <a:blip r:embed="rId2" cstate="print">
             <a:extLst>
               <a:ext uri="{28A0092B-C50C-407E-A947-70E740481C1C}">
-                <a14:useLocalDpi xmlns:a14="http://schemas.microsoft.com/office/drawing/2010/main" xmlns="" val="0"/>
+                <a14:useLocalDpi xmlns="" xmlns:a14="http://schemas.microsoft.com/office/drawing/2010/main" val="0"/>
               </a:ext>
             </a:extLst>
           </a:blip>
@@ -8944,7 +8935,7 @@
     </p:spTree>
     <p:extLst>
       <p:ext uri="{BB962C8B-B14F-4D97-AF65-F5344CB8AC3E}">
-        <p14:creationId xmlns:p14="http://schemas.microsoft.com/office/powerpoint/2010/main" xmlns="" val="3985286661"/>
+        <p14:creationId xmlns="" xmlns:p14="http://schemas.microsoft.com/office/powerpoint/2010/main" val="3985286661"/>
       </p:ext>
     </p:extLst>
   </p:cSld>
@@ -8983,7 +8974,7 @@
           <p:cNvPr id="2" name="Title 1">
             <a:extLst>
               <a:ext uri="{FF2B5EF4-FFF2-40B4-BE49-F238E27FC236}">
-                <a16:creationId xmlns:a16="http://schemas.microsoft.com/office/drawing/2014/main" xmlns="" id="{804D6BEF-CAC3-4E5F-94C1-42D03EF78D17}"/>
+                <a16:creationId xmlns="" xmlns:a16="http://schemas.microsoft.com/office/drawing/2014/main" id="{804D6BEF-CAC3-4E5F-94C1-42D03EF78D17}"/>
               </a:ext>
             </a:extLst>
           </p:cNvPr>
@@ -9012,7 +9003,7 @@
           <p:cNvPr id="3" name="Content Placeholder 2">
             <a:extLst>
               <a:ext uri="{FF2B5EF4-FFF2-40B4-BE49-F238E27FC236}">
-                <a16:creationId xmlns:a16="http://schemas.microsoft.com/office/drawing/2014/main" xmlns="" id="{4E56754D-69A4-432A-A381-04F413EB7E26}"/>
+                <a16:creationId xmlns="" xmlns:a16="http://schemas.microsoft.com/office/drawing/2014/main" id="{4E56754D-69A4-432A-A381-04F413EB7E26}"/>
               </a:ext>
             </a:extLst>
           </p:cNvPr>
@@ -9058,7 +9049,7 @@
           <p:cNvPr id="4" name="Picture 3">
             <a:extLst>
               <a:ext uri="{FF2B5EF4-FFF2-40B4-BE49-F238E27FC236}">
-                <a16:creationId xmlns:a16="http://schemas.microsoft.com/office/drawing/2014/main" xmlns="" id="{CE8F705F-E7A0-4D58-949D-E7A614792454}"/>
+                <a16:creationId xmlns="" xmlns:a16="http://schemas.microsoft.com/office/drawing/2014/main" id="{CE8F705F-E7A0-4D58-949D-E7A614792454}"/>
               </a:ext>
             </a:extLst>
           </p:cNvPr>
@@ -9071,7 +9062,7 @@
           <a:blip r:embed="rId2" cstate="print">
             <a:extLst>
               <a:ext uri="{28A0092B-C50C-407E-A947-70E740481C1C}">
-                <a14:useLocalDpi xmlns:a14="http://schemas.microsoft.com/office/drawing/2010/main" xmlns="" val="0"/>
+                <a14:useLocalDpi xmlns="" xmlns:a14="http://schemas.microsoft.com/office/drawing/2010/main" val="0"/>
               </a:ext>
             </a:extLst>
           </a:blip>
@@ -9094,7 +9085,7 @@
           <p:cNvPr id="7" name="Content Placeholder 2">
             <a:extLst>
               <a:ext uri="{FF2B5EF4-FFF2-40B4-BE49-F238E27FC236}">
-                <a16:creationId xmlns:a16="http://schemas.microsoft.com/office/drawing/2014/main" xmlns="" id="{041F66B2-4920-4C66-9023-DAB1E5D25A69}"/>
+                <a16:creationId xmlns="" xmlns:a16="http://schemas.microsoft.com/office/drawing/2014/main" id="{041F66B2-4920-4C66-9023-DAB1E5D25A69}"/>
               </a:ext>
             </a:extLst>
           </p:cNvPr>
@@ -9392,7 +9383,7 @@
     </p:spTree>
     <p:extLst>
       <p:ext uri="{BB962C8B-B14F-4D97-AF65-F5344CB8AC3E}">
-        <p14:creationId xmlns:p14="http://schemas.microsoft.com/office/powerpoint/2010/main" xmlns="" val="1980736762"/>
+        <p14:creationId xmlns="" xmlns:p14="http://schemas.microsoft.com/office/powerpoint/2010/main" val="1980736762"/>
       </p:ext>
     </p:extLst>
   </p:cSld>
@@ -9664,7 +9655,7 @@
   <a:extraClrSchemeLst/>
   <a:extLst>
     <a:ext uri="{05A4C25C-085E-4340-85A3-A5531E510DB2}">
-      <thm15:themeFamily xmlns:thm15="http://schemas.microsoft.com/office/thememl/2012/main" xmlns="" name="Depth" id="{7BEAFC2A-325C-49C4-AC08-2B765DA903F9}" vid="{1735E755-43E6-43AA-ABA2-C989ECC79AF5}"/>
+      <thm15:themeFamily xmlns="" xmlns:thm15="http://schemas.microsoft.com/office/thememl/2012/main" name="Depth" id="{7BEAFC2A-325C-49C4-AC08-2B765DA903F9}" vid="{1735E755-43E6-43AA-ABA2-C989ECC79AF5}"/>
     </a:ext>
   </a:extLst>
 </a:theme>
@@ -9959,7 +9950,7 @@
   <a:extraClrSchemeLst/>
   <a:extLst>
     <a:ext uri="{05A4C25C-085E-4340-85A3-A5531E510DB2}">
-      <thm15:themeFamily xmlns:thm15="http://schemas.microsoft.com/office/thememl/2012/main" xmlns="" name="Office Theme" id="{62F939B6-93AF-4DB8-9C6B-D6C7DFDC589F}" vid="{4A3C46E8-61CC-4603-A589-7422A47A8E4A}"/>
+      <thm15:themeFamily xmlns="" xmlns:thm15="http://schemas.microsoft.com/office/thememl/2012/main" name="Office Theme" id="{62F939B6-93AF-4DB8-9C6B-D6C7DFDC589F}" vid="{4A3C46E8-61CC-4603-A589-7422A47A8E4A}"/>
     </a:ext>
   </a:extLst>
 </a:theme>

</xml_diff>

<commit_message>
Minor changes to presentation to improve look of a few slides
</commit_message>
<xml_diff>
--- a/Group/Presentations/Pitch #2 (New).pptx
+++ b/Group/Presentations/Pitch #2 (New).pptx
@@ -118,7 +118,18 @@
   </p:defaultTextStyle>
   <p:extLst>
     <p:ext uri="{EFAFB233-063F-42B5-8137-9DF3F51BA10A}">
-      <p15:sldGuideLst xmlns="" xmlns:p15="http://schemas.microsoft.com/office/powerpoint/2012/main"/>
+      <p15:sldGuideLst xmlns:p15="http://schemas.microsoft.com/office/powerpoint/2012/main">
+        <p15:guide id="1" orient="horz" pos="2160">
+          <p15:clr>
+            <a:srgbClr val="A4A3A4"/>
+          </p15:clr>
+        </p15:guide>
+        <p15:guide id="2" pos="3840">
+          <p15:clr>
+            <a:srgbClr val="A4A3A4"/>
+          </p15:clr>
+        </p15:guide>
+      </p15:sldGuideLst>
     </p:ext>
   </p:extLst>
 </p:presentation>
@@ -380,7 +391,7 @@
     </p:spTree>
     <p:extLst>
       <p:ext uri="{BB962C8B-B14F-4D97-AF65-F5344CB8AC3E}">
-        <p14:creationId xmlns="" xmlns:p14="http://schemas.microsoft.com/office/powerpoint/2010/main" val="2712662513"/>
+        <p14:creationId xmlns:p14="http://schemas.microsoft.com/office/powerpoint/2010/main" val="2712662513"/>
       </p:ext>
     </p:extLst>
   </p:cSld>
@@ -555,7 +566,7 @@
     </p:spTree>
     <p:extLst>
       <p:ext uri="{BB962C8B-B14F-4D97-AF65-F5344CB8AC3E}">
-        <p14:creationId xmlns="" xmlns:p14="http://schemas.microsoft.com/office/powerpoint/2010/main" val="344233343"/>
+        <p14:creationId xmlns:p14="http://schemas.microsoft.com/office/powerpoint/2010/main" val="344233343"/>
       </p:ext>
     </p:extLst>
   </p:cSld>
@@ -711,7 +722,7 @@
     </p:spTree>
     <p:extLst>
       <p:ext uri="{BB962C8B-B14F-4D97-AF65-F5344CB8AC3E}">
-        <p14:creationId xmlns="" xmlns:p14="http://schemas.microsoft.com/office/powerpoint/2010/main" val="843437973"/>
+        <p14:creationId xmlns:p14="http://schemas.microsoft.com/office/powerpoint/2010/main" val="843437973"/>
       </p:ext>
     </p:extLst>
   </p:cSld>
@@ -970,7 +981,7 @@
     </p:spTree>
     <p:extLst>
       <p:ext uri="{BB962C8B-B14F-4D97-AF65-F5344CB8AC3E}">
-        <p14:creationId xmlns="" xmlns:p14="http://schemas.microsoft.com/office/powerpoint/2010/main" val="1137906455"/>
+        <p14:creationId xmlns:p14="http://schemas.microsoft.com/office/powerpoint/2010/main" val="1137906455"/>
       </p:ext>
     </p:extLst>
   </p:cSld>
@@ -1253,7 +1264,7 @@
     </p:spTree>
     <p:extLst>
       <p:ext uri="{BB962C8B-B14F-4D97-AF65-F5344CB8AC3E}">
-        <p14:creationId xmlns="" xmlns:p14="http://schemas.microsoft.com/office/powerpoint/2010/main" val="1051877521"/>
+        <p14:creationId xmlns:p14="http://schemas.microsoft.com/office/powerpoint/2010/main" val="1051877521"/>
       </p:ext>
     </p:extLst>
   </p:cSld>
@@ -1447,7 +1458,7 @@
     </p:spTree>
     <p:extLst>
       <p:ext uri="{BB962C8B-B14F-4D97-AF65-F5344CB8AC3E}">
-        <p14:creationId xmlns="" xmlns:p14="http://schemas.microsoft.com/office/powerpoint/2010/main" val="2305167636"/>
+        <p14:creationId xmlns:p14="http://schemas.microsoft.com/office/powerpoint/2010/main" val="2305167636"/>
       </p:ext>
     </p:extLst>
   </p:cSld>
@@ -1942,7 +1953,7 @@
     </p:spTree>
     <p:extLst>
       <p:ext uri="{BB962C8B-B14F-4D97-AF65-F5344CB8AC3E}">
-        <p14:creationId xmlns="" xmlns:p14="http://schemas.microsoft.com/office/powerpoint/2010/main" val="3536611326"/>
+        <p14:creationId xmlns:p14="http://schemas.microsoft.com/office/powerpoint/2010/main" val="3536611326"/>
       </p:ext>
     </p:extLst>
   </p:cSld>
@@ -2138,7 +2149,7 @@
     </p:spTree>
     <p:extLst>
       <p:ext uri="{BB962C8B-B14F-4D97-AF65-F5344CB8AC3E}">
-        <p14:creationId xmlns="" xmlns:p14="http://schemas.microsoft.com/office/powerpoint/2010/main" val="3538037079"/>
+        <p14:creationId xmlns:p14="http://schemas.microsoft.com/office/powerpoint/2010/main" val="3538037079"/>
       </p:ext>
     </p:extLst>
   </p:cSld>
@@ -2686,7 +2697,7 @@
     </p:spTree>
     <p:extLst>
       <p:ext uri="{BB962C8B-B14F-4D97-AF65-F5344CB8AC3E}">
-        <p14:creationId xmlns="" xmlns:p14="http://schemas.microsoft.com/office/powerpoint/2010/main" val="2905165778"/>
+        <p14:creationId xmlns:p14="http://schemas.microsoft.com/office/powerpoint/2010/main" val="2905165778"/>
       </p:ext>
     </p:extLst>
   </p:cSld>
@@ -3519,7 +3530,7 @@
     </p:spTree>
     <p:extLst>
       <p:ext uri="{BB962C8B-B14F-4D97-AF65-F5344CB8AC3E}">
-        <p14:creationId xmlns="" xmlns:p14="http://schemas.microsoft.com/office/powerpoint/2010/main" val="3712731"/>
+        <p14:creationId xmlns:p14="http://schemas.microsoft.com/office/powerpoint/2010/main" val="3712731"/>
       </p:ext>
     </p:extLst>
   </p:cSld>
@@ -3691,7 +3702,7 @@
     </p:spTree>
     <p:extLst>
       <p:ext uri="{BB962C8B-B14F-4D97-AF65-F5344CB8AC3E}">
-        <p14:creationId xmlns="" xmlns:p14="http://schemas.microsoft.com/office/powerpoint/2010/main" val="3951405928"/>
+        <p14:creationId xmlns:p14="http://schemas.microsoft.com/office/powerpoint/2010/main" val="3951405928"/>
       </p:ext>
     </p:extLst>
   </p:cSld>
@@ -3873,7 +3884,7 @@
     </p:spTree>
     <p:extLst>
       <p:ext uri="{BB962C8B-B14F-4D97-AF65-F5344CB8AC3E}">
-        <p14:creationId xmlns="" xmlns:p14="http://schemas.microsoft.com/office/powerpoint/2010/main" val="2572431118"/>
+        <p14:creationId xmlns:p14="http://schemas.microsoft.com/office/powerpoint/2010/main" val="2572431118"/>
       </p:ext>
     </p:extLst>
   </p:cSld>
@@ -4045,7 +4056,7 @@
     </p:spTree>
     <p:extLst>
       <p:ext uri="{BB962C8B-B14F-4D97-AF65-F5344CB8AC3E}">
-        <p14:creationId xmlns="" xmlns:p14="http://schemas.microsoft.com/office/powerpoint/2010/main" val="3190397485"/>
+        <p14:creationId xmlns:p14="http://schemas.microsoft.com/office/powerpoint/2010/main" val="3190397485"/>
       </p:ext>
     </p:extLst>
   </p:cSld>
@@ -4304,7 +4315,7 @@
     </p:spTree>
     <p:extLst>
       <p:ext uri="{BB962C8B-B14F-4D97-AF65-F5344CB8AC3E}">
-        <p14:creationId xmlns="" xmlns:p14="http://schemas.microsoft.com/office/powerpoint/2010/main" val="1907339060"/>
+        <p14:creationId xmlns:p14="http://schemas.microsoft.com/office/powerpoint/2010/main" val="1907339060"/>
       </p:ext>
     </p:extLst>
   </p:cSld>
@@ -4538,7 +4549,7 @@
     </p:spTree>
     <p:extLst>
       <p:ext uri="{BB962C8B-B14F-4D97-AF65-F5344CB8AC3E}">
-        <p14:creationId xmlns="" xmlns:p14="http://schemas.microsoft.com/office/powerpoint/2010/main" val="3589843527"/>
+        <p14:creationId xmlns:p14="http://schemas.microsoft.com/office/powerpoint/2010/main" val="3589843527"/>
       </p:ext>
     </p:extLst>
   </p:cSld>
@@ -4933,7 +4944,7 @@
     </p:spTree>
     <p:extLst>
       <p:ext uri="{BB962C8B-B14F-4D97-AF65-F5344CB8AC3E}">
-        <p14:creationId xmlns="" xmlns:p14="http://schemas.microsoft.com/office/powerpoint/2010/main" val="1348156944"/>
+        <p14:creationId xmlns:p14="http://schemas.microsoft.com/office/powerpoint/2010/main" val="1348156944"/>
       </p:ext>
     </p:extLst>
   </p:cSld>
@@ -5053,7 +5064,7 @@
     </p:spTree>
     <p:extLst>
       <p:ext uri="{BB962C8B-B14F-4D97-AF65-F5344CB8AC3E}">
-        <p14:creationId xmlns="" xmlns:p14="http://schemas.microsoft.com/office/powerpoint/2010/main" val="7440479"/>
+        <p14:creationId xmlns:p14="http://schemas.microsoft.com/office/powerpoint/2010/main" val="7440479"/>
       </p:ext>
     </p:extLst>
   </p:cSld>
@@ -5150,7 +5161,7 @@
     </p:spTree>
     <p:extLst>
       <p:ext uri="{BB962C8B-B14F-4D97-AF65-F5344CB8AC3E}">
-        <p14:creationId xmlns="" xmlns:p14="http://schemas.microsoft.com/office/powerpoint/2010/main" val="4287353945"/>
+        <p14:creationId xmlns:p14="http://schemas.microsoft.com/office/powerpoint/2010/main" val="4287353945"/>
       </p:ext>
     </p:extLst>
   </p:cSld>
@@ -5425,7 +5436,7 @@
     </p:spTree>
     <p:extLst>
       <p:ext uri="{BB962C8B-B14F-4D97-AF65-F5344CB8AC3E}">
-        <p14:creationId xmlns="" xmlns:p14="http://schemas.microsoft.com/office/powerpoint/2010/main" val="3320250197"/>
+        <p14:creationId xmlns:p14="http://schemas.microsoft.com/office/powerpoint/2010/main" val="3320250197"/>
       </p:ext>
     </p:extLst>
   </p:cSld>
@@ -5708,7 +5719,7 @@
     </p:spTree>
     <p:extLst>
       <p:ext uri="{BB962C8B-B14F-4D97-AF65-F5344CB8AC3E}">
-        <p14:creationId xmlns="" xmlns:p14="http://schemas.microsoft.com/office/powerpoint/2010/main" val="1022564394"/>
+        <p14:creationId xmlns:p14="http://schemas.microsoft.com/office/powerpoint/2010/main" val="1022564394"/>
       </p:ext>
     </p:extLst>
   </p:cSld>
@@ -6022,7 +6033,7 @@
     </p:spTree>
     <p:extLst>
       <p:ext uri="{BB962C8B-B14F-4D97-AF65-F5344CB8AC3E}">
-        <p14:creationId xmlns="" xmlns:p14="http://schemas.microsoft.com/office/powerpoint/2010/main" val="3301980907"/>
+        <p14:creationId xmlns:p14="http://schemas.microsoft.com/office/powerpoint/2010/main" val="3301980907"/>
       </p:ext>
     </p:extLst>
   </p:cSld>
@@ -6466,7 +6477,7 @@
           <p:cNvPr id="3" name="Subtitle 2">
             <a:extLst>
               <a:ext uri="{FF2B5EF4-FFF2-40B4-BE49-F238E27FC236}">
-                <a16:creationId xmlns="" xmlns:a16="http://schemas.microsoft.com/office/drawing/2014/main" id="{5ABA27A7-F554-431F-AC36-677718D18D0D}"/>
+                <a16:creationId xmlns:a16="http://schemas.microsoft.com/office/drawing/2014/main" id="{5ABA27A7-F554-431F-AC36-677718D18D0D}"/>
               </a:ext>
             </a:extLst>
           </p:cNvPr>
@@ -6494,7 +6505,7 @@
           <p:cNvPr id="5" name="Picture 4">
             <a:extLst>
               <a:ext uri="{FF2B5EF4-FFF2-40B4-BE49-F238E27FC236}">
-                <a16:creationId xmlns="" xmlns:a16="http://schemas.microsoft.com/office/drawing/2014/main" id="{56BC570F-275E-4863-875C-196A7F70F273}"/>
+                <a16:creationId xmlns:a16="http://schemas.microsoft.com/office/drawing/2014/main" id="{56BC570F-275E-4863-875C-196A7F70F273}"/>
               </a:ext>
             </a:extLst>
           </p:cNvPr>
@@ -6507,7 +6518,7 @@
           <a:blip r:embed="rId2" cstate="print">
             <a:extLst>
               <a:ext uri="{28A0092B-C50C-407E-A947-70E740481C1C}">
-                <a14:useLocalDpi xmlns="" xmlns:a14="http://schemas.microsoft.com/office/drawing/2010/main" val="0"/>
+                <a14:useLocalDpi xmlns:a14="http://schemas.microsoft.com/office/drawing/2010/main" val="0"/>
               </a:ext>
             </a:extLst>
           </a:blip>
@@ -6530,7 +6541,7 @@
           <p:cNvPr id="6" name="Picture 5">
             <a:extLst>
               <a:ext uri="{FF2B5EF4-FFF2-40B4-BE49-F238E27FC236}">
-                <a16:creationId xmlns="" xmlns:a16="http://schemas.microsoft.com/office/drawing/2014/main" id="{96337E55-D478-4700-95FE-838A61730040}"/>
+                <a16:creationId xmlns:a16="http://schemas.microsoft.com/office/drawing/2014/main" id="{96337E55-D478-4700-95FE-838A61730040}"/>
               </a:ext>
             </a:extLst>
           </p:cNvPr>
@@ -6543,7 +6554,7 @@
           <a:blip r:embed="rId3" cstate="print">
             <a:extLst>
               <a:ext uri="{28A0092B-C50C-407E-A947-70E740481C1C}">
-                <a14:useLocalDpi xmlns="" xmlns:a14="http://schemas.microsoft.com/office/drawing/2010/main" val="0"/>
+                <a14:useLocalDpi xmlns:a14="http://schemas.microsoft.com/office/drawing/2010/main" val="0"/>
               </a:ext>
             </a:extLst>
           </a:blip>
@@ -6564,20 +6575,13 @@
     </p:spTree>
     <p:extLst>
       <p:ext uri="{BB962C8B-B14F-4D97-AF65-F5344CB8AC3E}">
-        <p14:creationId xmlns="" xmlns:p14="http://schemas.microsoft.com/office/powerpoint/2010/main" val="635248824"/>
+        <p14:creationId xmlns:p14="http://schemas.microsoft.com/office/powerpoint/2010/main" val="635248824"/>
       </p:ext>
     </p:extLst>
   </p:cSld>
   <p:clrMapOvr>
     <a:masterClrMapping/>
   </p:clrMapOvr>
-  <p:timing>
-    <p:tnLst>
-      <p:par>
-        <p:cTn id="1" dur="indefinite" restart="never" nodeType="tmRoot"/>
-      </p:par>
-    </p:tnLst>
-  </p:timing>
 </p:sld>
 </file>
 
@@ -6603,7 +6607,7 @@
           <p:cNvPr id="2" name="Title 1">
             <a:extLst>
               <a:ext uri="{FF2B5EF4-FFF2-40B4-BE49-F238E27FC236}">
-                <a16:creationId xmlns="" xmlns:a16="http://schemas.microsoft.com/office/drawing/2014/main" id="{FE1707A6-BD99-4ECF-BCE4-A1519B020B36}"/>
+                <a16:creationId xmlns:a16="http://schemas.microsoft.com/office/drawing/2014/main" id="{FE1707A6-BD99-4ECF-BCE4-A1519B020B36}"/>
               </a:ext>
             </a:extLst>
           </p:cNvPr>
@@ -6637,7 +6641,7 @@
           <p:cNvPr id="5" name="Picture 4">
             <a:extLst>
               <a:ext uri="{FF2B5EF4-FFF2-40B4-BE49-F238E27FC236}">
-                <a16:creationId xmlns="" xmlns:a16="http://schemas.microsoft.com/office/drawing/2014/main" id="{55ED534F-A991-4E89-BFA6-62449C870B20}"/>
+                <a16:creationId xmlns:a16="http://schemas.microsoft.com/office/drawing/2014/main" id="{55ED534F-A991-4E89-BFA6-62449C870B20}"/>
               </a:ext>
             </a:extLst>
           </p:cNvPr>
@@ -6650,7 +6654,7 @@
           <a:blip r:embed="rId2" cstate="print">
             <a:extLst>
               <a:ext uri="{28A0092B-C50C-407E-A947-70E740481C1C}">
-                <a14:useLocalDpi xmlns="" xmlns:a14="http://schemas.microsoft.com/office/drawing/2010/main" val="0"/>
+                <a14:useLocalDpi xmlns:a14="http://schemas.microsoft.com/office/drawing/2010/main" val="0"/>
               </a:ext>
             </a:extLst>
           </a:blip>
@@ -6673,7 +6677,7 @@
           <p:cNvPr id="7" name="Picture 6">
             <a:extLst>
               <a:ext uri="{FF2B5EF4-FFF2-40B4-BE49-F238E27FC236}">
-                <a16:creationId xmlns="" xmlns:a16="http://schemas.microsoft.com/office/drawing/2014/main" id="{BBB2C33A-3D86-494C-831C-49E185BA475E}"/>
+                <a16:creationId xmlns:a16="http://schemas.microsoft.com/office/drawing/2014/main" id="{BBB2C33A-3D86-494C-831C-49E185BA475E}"/>
               </a:ext>
             </a:extLst>
           </p:cNvPr>
@@ -6686,7 +6690,7 @@
           <a:blip r:embed="rId3" cstate="print">
             <a:extLst>
               <a:ext uri="{28A0092B-C50C-407E-A947-70E740481C1C}">
-                <a14:useLocalDpi xmlns="" xmlns:a14="http://schemas.microsoft.com/office/drawing/2010/main" val="0"/>
+                <a14:useLocalDpi xmlns:a14="http://schemas.microsoft.com/office/drawing/2010/main" val="0"/>
               </a:ext>
             </a:extLst>
           </a:blip>
@@ -6709,7 +6713,7 @@
           <p:cNvPr id="8" name="TextBox 7">
             <a:extLst>
               <a:ext uri="{FF2B5EF4-FFF2-40B4-BE49-F238E27FC236}">
-                <a16:creationId xmlns="" xmlns:a16="http://schemas.microsoft.com/office/drawing/2014/main" id="{046F16AB-849B-4477-A6EB-C6E5431CA61C}"/>
+                <a16:creationId xmlns:a16="http://schemas.microsoft.com/office/drawing/2014/main" id="{046F16AB-849B-4477-A6EB-C6E5431CA61C}"/>
               </a:ext>
             </a:extLst>
           </p:cNvPr>
@@ -6760,7 +6764,7 @@
           <p:cNvPr id="10" name="Picture 9">
             <a:extLst>
               <a:ext uri="{FF2B5EF4-FFF2-40B4-BE49-F238E27FC236}">
-                <a16:creationId xmlns="" xmlns:a16="http://schemas.microsoft.com/office/drawing/2014/main" id="{4E596BB1-81C0-4A9D-AF89-5E264D6D787C}"/>
+                <a16:creationId xmlns:a16="http://schemas.microsoft.com/office/drawing/2014/main" id="{4E596BB1-81C0-4A9D-AF89-5E264D6D787C}"/>
               </a:ext>
             </a:extLst>
           </p:cNvPr>
@@ -6773,7 +6777,7 @@
           <a:blip r:embed="rId4" cstate="print">
             <a:extLst>
               <a:ext uri="{28A0092B-C50C-407E-A947-70E740481C1C}">
-                <a14:useLocalDpi xmlns="" xmlns:a14="http://schemas.microsoft.com/office/drawing/2010/main" val="0"/>
+                <a14:useLocalDpi xmlns:a14="http://schemas.microsoft.com/office/drawing/2010/main" val="0"/>
               </a:ext>
             </a:extLst>
           </a:blip>
@@ -6794,20 +6798,13 @@
     </p:spTree>
     <p:extLst>
       <p:ext uri="{BB962C8B-B14F-4D97-AF65-F5344CB8AC3E}">
-        <p14:creationId xmlns="" xmlns:p14="http://schemas.microsoft.com/office/powerpoint/2010/main" val="2755524296"/>
+        <p14:creationId xmlns:p14="http://schemas.microsoft.com/office/powerpoint/2010/main" val="2755524296"/>
       </p:ext>
     </p:extLst>
   </p:cSld>
   <p:clrMapOvr>
     <a:masterClrMapping/>
   </p:clrMapOvr>
-  <p:timing>
-    <p:tnLst>
-      <p:par>
-        <p:cTn id="1" dur="indefinite" restart="never" nodeType="tmRoot"/>
-      </p:par>
-    </p:tnLst>
-  </p:timing>
 </p:sld>
 </file>
 
@@ -6833,7 +6830,7 @@
           <p:cNvPr id="2" name="Title 1">
             <a:extLst>
               <a:ext uri="{FF2B5EF4-FFF2-40B4-BE49-F238E27FC236}">
-                <a16:creationId xmlns="" xmlns:a16="http://schemas.microsoft.com/office/drawing/2014/main" id="{E0F7E4AF-F7ED-4B09-918E-8A07ACAEE2B9}"/>
+                <a16:creationId xmlns:a16="http://schemas.microsoft.com/office/drawing/2014/main" id="{E0F7E4AF-F7ED-4B09-918E-8A07ACAEE2B9}"/>
               </a:ext>
             </a:extLst>
           </p:cNvPr>
@@ -6861,7 +6858,7 @@
           <p:cNvPr id="3" name="Content Placeholder 2">
             <a:extLst>
               <a:ext uri="{FF2B5EF4-FFF2-40B4-BE49-F238E27FC236}">
-                <a16:creationId xmlns="" xmlns:a16="http://schemas.microsoft.com/office/drawing/2014/main" id="{D8CA3B48-BFC3-4CE8-ABA5-33DE2BF3D214}"/>
+                <a16:creationId xmlns:a16="http://schemas.microsoft.com/office/drawing/2014/main" id="{D8CA3B48-BFC3-4CE8-ABA5-33DE2BF3D214}"/>
               </a:ext>
             </a:extLst>
           </p:cNvPr>
@@ -6907,7 +6904,7 @@
           <p:cNvPr id="4" name="Picture 3">
             <a:extLst>
               <a:ext uri="{FF2B5EF4-FFF2-40B4-BE49-F238E27FC236}">
-                <a16:creationId xmlns="" xmlns:a16="http://schemas.microsoft.com/office/drawing/2014/main" id="{06FB59FE-B52F-4C2C-9438-8BA2BF049E33}"/>
+                <a16:creationId xmlns:a16="http://schemas.microsoft.com/office/drawing/2014/main" id="{06FB59FE-B52F-4C2C-9438-8BA2BF049E33}"/>
               </a:ext>
             </a:extLst>
           </p:cNvPr>
@@ -6920,7 +6917,7 @@
           <a:blip r:embed="rId2" cstate="print">
             <a:extLst>
               <a:ext uri="{28A0092B-C50C-407E-A947-70E740481C1C}">
-                <a14:useLocalDpi xmlns="" xmlns:a14="http://schemas.microsoft.com/office/drawing/2010/main" val="0"/>
+                <a14:useLocalDpi xmlns:a14="http://schemas.microsoft.com/office/drawing/2010/main" val="0"/>
               </a:ext>
             </a:extLst>
           </a:blip>
@@ -6941,20 +6938,13 @@
     </p:spTree>
     <p:extLst>
       <p:ext uri="{BB962C8B-B14F-4D97-AF65-F5344CB8AC3E}">
-        <p14:creationId xmlns="" xmlns:p14="http://schemas.microsoft.com/office/powerpoint/2010/main" val="1489102986"/>
+        <p14:creationId xmlns:p14="http://schemas.microsoft.com/office/powerpoint/2010/main" val="1489102986"/>
       </p:ext>
     </p:extLst>
   </p:cSld>
   <p:clrMapOvr>
     <a:masterClrMapping/>
   </p:clrMapOvr>
-  <p:timing>
-    <p:tnLst>
-      <p:par>
-        <p:cTn id="1" dur="indefinite" restart="never" nodeType="tmRoot"/>
-      </p:par>
-    </p:tnLst>
-  </p:timing>
 </p:sld>
 </file>
 
@@ -6980,7 +6970,7 @@
           <p:cNvPr id="2" name="Title 1">
             <a:extLst>
               <a:ext uri="{FF2B5EF4-FFF2-40B4-BE49-F238E27FC236}">
-                <a16:creationId xmlns="" xmlns:a16="http://schemas.microsoft.com/office/drawing/2014/main" id="{D043D610-4505-47F9-8744-878655395FD3}"/>
+                <a16:creationId xmlns:a16="http://schemas.microsoft.com/office/drawing/2014/main" id="{D043D610-4505-47F9-8744-878655395FD3}"/>
               </a:ext>
             </a:extLst>
           </p:cNvPr>
@@ -7009,7 +6999,7 @@
           <p:cNvPr id="3" name="Content Placeholder 2">
             <a:extLst>
               <a:ext uri="{FF2B5EF4-FFF2-40B4-BE49-F238E27FC236}">
-                <a16:creationId xmlns="" xmlns:a16="http://schemas.microsoft.com/office/drawing/2014/main" id="{11AD7357-80CD-434C-A730-12B8A62A81E7}"/>
+                <a16:creationId xmlns:a16="http://schemas.microsoft.com/office/drawing/2014/main" id="{11AD7357-80CD-434C-A730-12B8A62A81E7}"/>
               </a:ext>
             </a:extLst>
           </p:cNvPr>
@@ -7052,7 +7042,7 @@
           <p:cNvPr id="4" name="Picture 3">
             <a:extLst>
               <a:ext uri="{FF2B5EF4-FFF2-40B4-BE49-F238E27FC236}">
-                <a16:creationId xmlns="" xmlns:a16="http://schemas.microsoft.com/office/drawing/2014/main" id="{90BB4250-BB84-4AC9-883A-0733A04A65D5}"/>
+                <a16:creationId xmlns:a16="http://schemas.microsoft.com/office/drawing/2014/main" id="{90BB4250-BB84-4AC9-883A-0733A04A65D5}"/>
               </a:ext>
             </a:extLst>
           </p:cNvPr>
@@ -7065,7 +7055,7 @@
           <a:blip r:embed="rId2" cstate="print">
             <a:extLst>
               <a:ext uri="{28A0092B-C50C-407E-A947-70E740481C1C}">
-                <a14:useLocalDpi xmlns="" xmlns:a14="http://schemas.microsoft.com/office/drawing/2010/main" val="0"/>
+                <a14:useLocalDpi xmlns:a14="http://schemas.microsoft.com/office/drawing/2010/main" val="0"/>
               </a:ext>
             </a:extLst>
           </a:blip>
@@ -7086,20 +7076,13 @@
     </p:spTree>
     <p:extLst>
       <p:ext uri="{BB962C8B-B14F-4D97-AF65-F5344CB8AC3E}">
-        <p14:creationId xmlns="" xmlns:p14="http://schemas.microsoft.com/office/powerpoint/2010/main" val="2145066065"/>
+        <p14:creationId xmlns:p14="http://schemas.microsoft.com/office/powerpoint/2010/main" val="2145066065"/>
       </p:ext>
     </p:extLst>
   </p:cSld>
   <p:clrMapOvr>
     <a:masterClrMapping/>
   </p:clrMapOvr>
-  <p:timing>
-    <p:tnLst>
-      <p:par>
-        <p:cTn id="1" dur="indefinite" restart="never" nodeType="tmRoot"/>
-      </p:par>
-    </p:tnLst>
-  </p:timing>
 </p:sld>
 </file>
 
@@ -7125,7 +7108,7 @@
           <p:cNvPr id="2" name="Title 1">
             <a:extLst>
               <a:ext uri="{FF2B5EF4-FFF2-40B4-BE49-F238E27FC236}">
-                <a16:creationId xmlns="" xmlns:a16="http://schemas.microsoft.com/office/drawing/2014/main" id="{3CE6AB90-DF75-472E-AD77-3775F01A98B3}"/>
+                <a16:creationId xmlns:a16="http://schemas.microsoft.com/office/drawing/2014/main" id="{3CE6AB90-DF75-472E-AD77-3775F01A98B3}"/>
               </a:ext>
             </a:extLst>
           </p:cNvPr>
@@ -7154,7 +7137,7 @@
           <p:cNvPr id="3" name="Content Placeholder 2">
             <a:extLst>
               <a:ext uri="{FF2B5EF4-FFF2-40B4-BE49-F238E27FC236}">
-                <a16:creationId xmlns="" xmlns:a16="http://schemas.microsoft.com/office/drawing/2014/main" id="{69EA60D7-4061-409A-8161-30DF4AA1AE8A}"/>
+                <a16:creationId xmlns:a16="http://schemas.microsoft.com/office/drawing/2014/main" id="{69EA60D7-4061-409A-8161-30DF4AA1AE8A}"/>
               </a:ext>
             </a:extLst>
           </p:cNvPr>
@@ -7230,7 +7213,7 @@
           <p:cNvPr id="4" name="Picture 3">
             <a:extLst>
               <a:ext uri="{FF2B5EF4-FFF2-40B4-BE49-F238E27FC236}">
-                <a16:creationId xmlns="" xmlns:a16="http://schemas.microsoft.com/office/drawing/2014/main" id="{741B2568-12CC-4C2F-B04D-B5FDE1AFA72D}"/>
+                <a16:creationId xmlns:a16="http://schemas.microsoft.com/office/drawing/2014/main" id="{741B2568-12CC-4C2F-B04D-B5FDE1AFA72D}"/>
               </a:ext>
             </a:extLst>
           </p:cNvPr>
@@ -7243,7 +7226,7 @@
           <a:blip r:embed="rId3" cstate="print">
             <a:extLst>
               <a:ext uri="{28A0092B-C50C-407E-A947-70E740481C1C}">
-                <a14:useLocalDpi xmlns="" xmlns:a14="http://schemas.microsoft.com/office/drawing/2010/main" val="0"/>
+                <a14:useLocalDpi xmlns:a14="http://schemas.microsoft.com/office/drawing/2010/main" val="0"/>
               </a:ext>
             </a:extLst>
           </a:blip>
@@ -7266,7 +7249,7 @@
           <p:cNvPr id="5" name="Content Placeholder 2">
             <a:extLst>
               <a:ext uri="{FF2B5EF4-FFF2-40B4-BE49-F238E27FC236}">
-                <a16:creationId xmlns="" xmlns:a16="http://schemas.microsoft.com/office/drawing/2014/main" id="{188A2E33-672F-496D-9FED-A7EDEB426E8B}"/>
+                <a16:creationId xmlns:a16="http://schemas.microsoft.com/office/drawing/2014/main" id="{188A2E33-672F-496D-9FED-A7EDEB426E8B}"/>
               </a:ext>
             </a:extLst>
           </p:cNvPr>
@@ -7598,7 +7581,7 @@
           <p:cNvPr id="7" name="Picture 6">
             <a:extLst>
               <a:ext uri="{FF2B5EF4-FFF2-40B4-BE49-F238E27FC236}">
-                <a16:creationId xmlns="" xmlns:a16="http://schemas.microsoft.com/office/drawing/2014/main" id="{7194B06A-984C-4517-A89C-2217CCE7E6D8}"/>
+                <a16:creationId xmlns:a16="http://schemas.microsoft.com/office/drawing/2014/main" id="{7194B06A-984C-4517-A89C-2217CCE7E6D8}"/>
               </a:ext>
             </a:extLst>
           </p:cNvPr>
@@ -7610,8 +7593,49 @@
         <p:blipFill rotWithShape="1">
           <a:blip r:embed="rId4" cstate="print">
             <a:extLst>
+              <a:ext uri="{BEBA8EAE-BF5A-486C-A8C5-ECC9F3942E4B}">
+                <a14:imgProps xmlns:a14="http://schemas.microsoft.com/office/drawing/2010/main">
+                  <a14:imgLayer r:embed="rId5">
+                    <a14:imgEffect>
+                      <a14:backgroundRemoval t="8231" b="89878" l="10000" r="90000">
+                        <a14:foregroundMark x1="29833" y1="14572" x2="32167" y2="9344"/>
+                        <a14:foregroundMark x1="30667" y1="13682" x2="36167" y2="9121"/>
+                        <a14:foregroundMark x1="32167" y1="8788" x2="32167" y2="8788"/>
+                        <a14:foregroundMark x1="29833" y1="12903" x2="26833" y2="10456"/>
+                        <a14:foregroundMark x1="38167" y1="23026" x2="44833" y2="15573"/>
+                        <a14:foregroundMark x1="42500" y1="16685" x2="39667" y2="19577"/>
+                        <a14:foregroundMark x1="39500" y1="18799" x2="42667" y2="16129"/>
+                        <a14:foregroundMark x1="38667" y1="20245" x2="43167" y2="16129"/>
+                        <a14:foregroundMark x1="49667" y1="19577" x2="54500" y2="22469"/>
+                        <a14:foregroundMark x1="55333" y1="23137" x2="49500" y2="18687"/>
+                        <a14:foregroundMark x1="54333" y1="23026" x2="53167" y2="19577"/>
+                        <a14:foregroundMark x1="53000" y1="21913" x2="50000" y2="19021"/>
+                        <a14:foregroundMark x1="63333" y1="24917" x2="61500" y2="33927"/>
+                        <a14:foregroundMark x1="61500" y1="33927" x2="48333" y2="29255"/>
+                        <a14:foregroundMark x1="66167" y1="28365" x2="65500" y2="26363"/>
+                        <a14:foregroundMark x1="68500" y1="26919" x2="72500" y2="28142"/>
+                        <a14:foregroundMark x1="67667" y1="27697" x2="72500" y2="31257"/>
+                        <a14:foregroundMark x1="28167" y1="23693" x2="37833" y2="68743"/>
+                        <a14:foregroundMark x1="37833" y1="68743" x2="37500" y2="58398"/>
+                        <a14:foregroundMark x1="37500" y1="58398" x2="39167" y2="69633"/>
+                        <a14:foregroundMark x1="39167" y1="69633" x2="29000" y2="76307"/>
+                        <a14:foregroundMark x1="29000" y1="76307" x2="36333" y2="68187"/>
+                        <a14:foregroundMark x1="36333" y1="68187" x2="38167" y2="58509"/>
+                        <a14:foregroundMark x1="38167" y1="58509" x2="29000" y2="40378"/>
+                        <a14:foregroundMark x1="29000" y1="40378" x2="28500" y2="30701"/>
+                        <a14:foregroundMark x1="28500" y1="30701" x2="33000" y2="40267"/>
+                        <a14:foregroundMark x1="33000" y1="40267" x2="32000" y2="49722"/>
+                        <a14:foregroundMark x1="32000" y1="49722" x2="37333" y2="67853"/>
+                        <a14:foregroundMark x1="37333" y1="67853" x2="37000" y2="58065"/>
+                        <a14:foregroundMark x1="37000" y1="58065" x2="35500" y2="69077"/>
+                        <a14:foregroundMark x1="33000" y1="8231" x2="32500" y2="8454"/>
+                      </a14:backgroundRemoval>
+                    </a14:imgEffect>
+                  </a14:imgLayer>
+                </a14:imgProps>
+              </a:ext>
               <a:ext uri="{28A0092B-C50C-407E-A947-70E740481C1C}">
-                <a14:useLocalDpi xmlns="" xmlns:a14="http://schemas.microsoft.com/office/drawing/2010/main" val="0"/>
+                <a14:useLocalDpi xmlns:a14="http://schemas.microsoft.com/office/drawing/2010/main" val="0"/>
               </a:ext>
             </a:extLst>
           </a:blip>
@@ -7620,55 +7644,125 @@
         </p:blipFill>
         <p:spPr>
           <a:xfrm>
-            <a:off x="8797404" y="2657024"/>
-            <a:ext cx="2321311" cy="3473409"/>
+            <a:off x="8397953" y="2665733"/>
+            <a:ext cx="3615708" cy="5410233"/>
           </a:xfrm>
-          <a:prstGeom prst="ellipse">
+          <a:prstGeom prst="rect">
             <a:avLst/>
           </a:prstGeom>
-          <a:ln w="63500" cap="rnd">
+        </p:spPr>
+      </p:pic>
+      <p:sp>
+        <p:nvSpPr>
+          <p:cNvPr id="6" name="Trapezoid 5">
+            <a:extLst>
+              <a:ext uri="{FF2B5EF4-FFF2-40B4-BE49-F238E27FC236}">
+                <a16:creationId xmlns:a16="http://schemas.microsoft.com/office/drawing/2014/main" id="{9E27CA8B-87AE-4836-AFE1-237EF243FF12}"/>
+              </a:ext>
+            </a:extLst>
+          </p:cNvPr>
+          <p:cNvSpPr/>
+          <p:nvPr/>
+        </p:nvSpPr>
+        <p:spPr>
+          <a:xfrm rot="10514183">
+            <a:off x="8657617" y="1303506"/>
+            <a:ext cx="97276" cy="194553"/>
+          </a:xfrm>
+          <a:prstGeom prst="trapezoid">
+            <a:avLst/>
+          </a:prstGeom>
+          <a:solidFill>
+            <a:srgbClr val="70483F"/>
+          </a:solidFill>
+          <a:ln>
             <a:solidFill>
-              <a:srgbClr val="333333"/>
+              <a:srgbClr val="70483F"/>
             </a:solidFill>
           </a:ln>
-          <a:effectLst>
-            <a:outerShdw blurRad="381000" dist="292100" dir="5400000" sx="-80000" sy="-18000" rotWithShape="0">
-              <a:srgbClr val="000000">
-                <a:alpha val="22000"/>
-              </a:srgbClr>
-            </a:outerShdw>
-          </a:effectLst>
-          <a:scene3d>
-            <a:camera prst="orthographicFront"/>
-            <a:lightRig rig="contrasting" dir="t">
-              <a:rot lat="0" lon="0" rev="3000000"/>
-            </a:lightRig>
-          </a:scene3d>
-          <a:sp3d contourW="7620">
-            <a:bevelT w="95250" h="31750"/>
-            <a:contourClr>
-              <a:srgbClr val="333333"/>
-            </a:contourClr>
-          </a:sp3d>
+        </p:spPr>
+        <p:style>
+          <a:lnRef idx="2">
+            <a:schemeClr val="accent1">
+              <a:shade val="50000"/>
+            </a:schemeClr>
+          </a:lnRef>
+          <a:fillRef idx="1">
+            <a:schemeClr val="accent1"/>
+          </a:fillRef>
+          <a:effectRef idx="0">
+            <a:schemeClr val="accent1"/>
+          </a:effectRef>
+          <a:fontRef idx="minor">
+            <a:schemeClr val="lt1"/>
+          </a:fontRef>
+        </p:style>
+        <p:txBody>
+          <a:bodyPr rtlCol="0" anchor="ctr"/>
+          <a:lstStyle/>
+          <a:p>
+            <a:pPr algn="ctr"/>
+            <a:endParaRPr lang="en-GB"/>
+          </a:p>
+        </p:txBody>
+      </p:sp>
+      <p:pic>
+        <p:nvPicPr>
+          <p:cNvPr id="1026" name="Picture 2" descr="http://www.pngall.com/wp-content/uploads/2016/02/Acorn-PNG-2.png">
+            <a:extLst>
+              <a:ext uri="{FF2B5EF4-FFF2-40B4-BE49-F238E27FC236}">
+                <a16:creationId xmlns:a16="http://schemas.microsoft.com/office/drawing/2014/main" id="{9E2A1BC0-34D3-487F-ADD1-D464A60A1411}"/>
+              </a:ext>
+            </a:extLst>
+          </p:cNvPr>
+          <p:cNvPicPr>
+            <a:picLocks noChangeAspect="1" noChangeArrowheads="1"/>
+          </p:cNvPicPr>
+          <p:nvPr/>
+        </p:nvPicPr>
+        <p:blipFill>
+          <a:blip r:embed="rId6">
+            <a:extLst>
+              <a:ext uri="{28A0092B-C50C-407E-A947-70E740481C1C}">
+                <a14:useLocalDpi xmlns:a14="http://schemas.microsoft.com/office/drawing/2010/main" val="0"/>
+              </a:ext>
+            </a:extLst>
+          </a:blip>
+          <a:srcRect/>
+          <a:stretch>
+            <a:fillRect/>
+          </a:stretch>
+        </p:blipFill>
+        <p:spPr bwMode="auto">
+          <a:xfrm rot="3870631">
+            <a:off x="7886393" y="1512218"/>
+            <a:ext cx="1851431" cy="1233380"/>
+          </a:xfrm>
+          <a:prstGeom prst="rect">
+            <a:avLst/>
+          </a:prstGeom>
+          <a:noFill/>
+          <a:extLst>
+            <a:ext uri="{909E8E84-426E-40DD-AFC4-6F175D3DCCD1}">
+              <a14:hiddenFill xmlns:a14="http://schemas.microsoft.com/office/drawing/2010/main">
+                <a:solidFill>
+                  <a:srgbClr val="FFFFFF"/>
+                </a:solidFill>
+              </a14:hiddenFill>
+            </a:ext>
+          </a:extLst>
         </p:spPr>
       </p:pic>
     </p:spTree>
     <p:extLst>
       <p:ext uri="{BB962C8B-B14F-4D97-AF65-F5344CB8AC3E}">
-        <p14:creationId xmlns="" xmlns:p14="http://schemas.microsoft.com/office/powerpoint/2010/main" val="3717006473"/>
+        <p14:creationId xmlns:p14="http://schemas.microsoft.com/office/powerpoint/2010/main" val="3717006473"/>
       </p:ext>
     </p:extLst>
   </p:cSld>
   <p:clrMapOvr>
     <a:masterClrMapping/>
   </p:clrMapOvr>
-  <p:timing>
-    <p:tnLst>
-      <p:par>
-        <p:cTn id="1" dur="indefinite" restart="never" nodeType="tmRoot"/>
-      </p:par>
-    </p:tnLst>
-  </p:timing>
 </p:sld>
 </file>
 
@@ -7705,8 +7799,8 @@
         </p:blipFill>
         <p:spPr>
           <a:xfrm>
-            <a:off x="5700156" y="591787"/>
-            <a:ext cx="6266213" cy="6266213"/>
+            <a:off x="6263148" y="1148889"/>
+            <a:ext cx="5261726" cy="5261726"/>
           </a:xfrm>
           <a:prstGeom prst="rect">
             <a:avLst/>
@@ -7718,7 +7812,7 @@
           <p:cNvPr id="8" name="Oval 7">
             <a:extLst>
               <a:ext uri="{FF2B5EF4-FFF2-40B4-BE49-F238E27FC236}">
-                <a16:creationId xmlns="" xmlns:a16="http://schemas.microsoft.com/office/drawing/2014/main" id="{552A35DA-0C5D-44FA-9872-AC54B0A3A4D7}"/>
+                <a16:creationId xmlns:a16="http://schemas.microsoft.com/office/drawing/2014/main" id="{552A35DA-0C5D-44FA-9872-AC54B0A3A4D7}"/>
               </a:ext>
             </a:extLst>
           </p:cNvPr>
@@ -7727,8 +7821,8 @@
         </p:nvSpPr>
         <p:spPr>
           <a:xfrm>
-            <a:off x="8549013" y="3033639"/>
-            <a:ext cx="262647" cy="272374"/>
+            <a:off x="8716692" y="3102473"/>
+            <a:ext cx="177319" cy="203124"/>
           </a:xfrm>
           <a:prstGeom prst="ellipse">
             <a:avLst/>
@@ -7755,7 +7849,7 @@
           <a:lstStyle/>
           <a:p>
             <a:pPr algn="ctr"/>
-            <a:endParaRPr lang="en-GB"/>
+            <a:endParaRPr lang="en-GB" dirty="0"/>
           </a:p>
         </p:txBody>
       </p:sp>
@@ -7764,7 +7858,7 @@
           <p:cNvPr id="2" name="Title 1">
             <a:extLst>
               <a:ext uri="{FF2B5EF4-FFF2-40B4-BE49-F238E27FC236}">
-                <a16:creationId xmlns="" xmlns:a16="http://schemas.microsoft.com/office/drawing/2014/main" id="{35ACCF0E-D6FE-421E-BA99-91383EEB7C52}"/>
+                <a16:creationId xmlns:a16="http://schemas.microsoft.com/office/drawing/2014/main" id="{35ACCF0E-D6FE-421E-BA99-91383EEB7C52}"/>
               </a:ext>
             </a:extLst>
           </p:cNvPr>
@@ -7793,7 +7887,7 @@
           <p:cNvPr id="4" name="Picture 3">
             <a:extLst>
               <a:ext uri="{FF2B5EF4-FFF2-40B4-BE49-F238E27FC236}">
-                <a16:creationId xmlns="" xmlns:a16="http://schemas.microsoft.com/office/drawing/2014/main" id="{89F1976A-F61B-4422-9B67-C0F001252090}"/>
+                <a16:creationId xmlns:a16="http://schemas.microsoft.com/office/drawing/2014/main" id="{89F1976A-F61B-4422-9B67-C0F001252090}"/>
               </a:ext>
             </a:extLst>
           </p:cNvPr>
@@ -7806,7 +7900,7 @@
           <a:blip r:embed="rId4" cstate="print">
             <a:extLst>
               <a:ext uri="{28A0092B-C50C-407E-A947-70E740481C1C}">
-                <a14:useLocalDpi xmlns="" xmlns:a14="http://schemas.microsoft.com/office/drawing/2010/main" val="0"/>
+                <a14:useLocalDpi xmlns:a14="http://schemas.microsoft.com/office/drawing/2010/main" val="0"/>
               </a:ext>
             </a:extLst>
           </a:blip>
@@ -7829,7 +7923,7 @@
           <p:cNvPr id="5" name="Content Placeholder 2">
             <a:extLst>
               <a:ext uri="{FF2B5EF4-FFF2-40B4-BE49-F238E27FC236}">
-                <a16:creationId xmlns="" xmlns:a16="http://schemas.microsoft.com/office/drawing/2014/main" id="{85BD8BDC-A299-4E5C-9207-6B1ABA39F3E9}"/>
+                <a16:creationId xmlns:a16="http://schemas.microsoft.com/office/drawing/2014/main" id="{85BD8BDC-A299-4E5C-9207-6B1ABA39F3E9}"/>
               </a:ext>
             </a:extLst>
           </p:cNvPr>
@@ -7840,7 +7934,7 @@
         </p:nvSpPr>
         <p:spPr>
           <a:xfrm>
-            <a:off x="217475" y="4405820"/>
+            <a:off x="305966" y="3132553"/>
             <a:ext cx="10233800" cy="2283582"/>
           </a:xfrm>
           <a:prstGeom prst="rect">
@@ -8151,7 +8245,7 @@
           <p:cNvPr id="7" name="Picture 6">
             <a:extLst>
               <a:ext uri="{FF2B5EF4-FFF2-40B4-BE49-F238E27FC236}">
-                <a16:creationId xmlns="" xmlns:a16="http://schemas.microsoft.com/office/drawing/2014/main" id="{51BCDF80-65A3-4CB9-9B75-EAC219AA4963}"/>
+                <a16:creationId xmlns:a16="http://schemas.microsoft.com/office/drawing/2014/main" id="{51BCDF80-65A3-4CB9-9B75-EAC219AA4963}"/>
               </a:ext>
             </a:extLst>
           </p:cNvPr>
@@ -8164,7 +8258,7 @@
           <a:blip r:embed="rId5" cstate="print">
             <a:extLst>
               <a:ext uri="{BEBA8EAE-BF5A-486C-A8C5-ECC9F3942E4B}">
-                <a14:imgProps xmlns="" xmlns:a14="http://schemas.microsoft.com/office/drawing/2010/main">
+                <a14:imgProps xmlns:a14="http://schemas.microsoft.com/office/drawing/2010/main">
                   <a14:imgLayer r:embed="rId6">
                     <a14:imgEffect>
                       <a14:backgroundRemoval t="10000" b="90000" l="10000" r="90000"/>
@@ -8173,7 +8267,7 @@
                 </a14:imgProps>
               </a:ext>
               <a:ext uri="{28A0092B-C50C-407E-A947-70E740481C1C}">
-                <a14:useLocalDpi xmlns="" xmlns:a14="http://schemas.microsoft.com/office/drawing/2010/main" val="0"/>
+                <a14:useLocalDpi xmlns:a14="http://schemas.microsoft.com/office/drawing/2010/main" val="0"/>
               </a:ext>
             </a:extLst>
           </a:blip>
@@ -8183,8 +8277,8 @@
         </p:blipFill>
         <p:spPr>
           <a:xfrm>
-            <a:off x="7371034" y="1926292"/>
-            <a:ext cx="2857500" cy="2857500"/>
+            <a:off x="7904419" y="2349326"/>
+            <a:ext cx="1981528" cy="1981528"/>
           </a:xfrm>
           <a:prstGeom prst="rect">
             <a:avLst/>
@@ -8194,20 +8288,13 @@
     </p:spTree>
     <p:extLst>
       <p:ext uri="{BB962C8B-B14F-4D97-AF65-F5344CB8AC3E}">
-        <p14:creationId xmlns="" xmlns:p14="http://schemas.microsoft.com/office/powerpoint/2010/main" val="2716024304"/>
+        <p14:creationId xmlns:p14="http://schemas.microsoft.com/office/powerpoint/2010/main" val="2716024304"/>
       </p:ext>
     </p:extLst>
   </p:cSld>
   <p:clrMapOvr>
     <a:masterClrMapping/>
   </p:clrMapOvr>
-  <p:timing>
-    <p:tnLst>
-      <p:par>
-        <p:cTn id="1" dur="indefinite" restart="never" nodeType="tmRoot"/>
-      </p:par>
-    </p:tnLst>
-  </p:timing>
 </p:sld>
 </file>
 
@@ -8233,7 +8320,7 @@
           <p:cNvPr id="2" name="Title 1">
             <a:extLst>
               <a:ext uri="{FF2B5EF4-FFF2-40B4-BE49-F238E27FC236}">
-                <a16:creationId xmlns="" xmlns:a16="http://schemas.microsoft.com/office/drawing/2014/main" id="{1D8718C7-CAD2-4A55-8CED-01B5365C1260}"/>
+                <a16:creationId xmlns:a16="http://schemas.microsoft.com/office/drawing/2014/main" id="{1D8718C7-CAD2-4A55-8CED-01B5365C1260}"/>
               </a:ext>
             </a:extLst>
           </p:cNvPr>
@@ -8262,7 +8349,7 @@
           <p:cNvPr id="6" name="Content Placeholder 5">
             <a:extLst>
               <a:ext uri="{FF2B5EF4-FFF2-40B4-BE49-F238E27FC236}">
-                <a16:creationId xmlns="" xmlns:a16="http://schemas.microsoft.com/office/drawing/2014/main" id="{DAE12B24-F807-495D-90F7-62B7790B187B}"/>
+                <a16:creationId xmlns:a16="http://schemas.microsoft.com/office/drawing/2014/main" id="{DAE12B24-F807-495D-90F7-62B7790B187B}"/>
               </a:ext>
             </a:extLst>
           </p:cNvPr>
@@ -8277,7 +8364,7 @@
           <a:blip r:embed="rId2" cstate="print">
             <a:extLst>
               <a:ext uri="{28A0092B-C50C-407E-A947-70E740481C1C}">
-                <a14:useLocalDpi xmlns="" xmlns:a14="http://schemas.microsoft.com/office/drawing/2010/main" val="0"/>
+                <a14:useLocalDpi xmlns:a14="http://schemas.microsoft.com/office/drawing/2010/main" val="0"/>
               </a:ext>
             </a:extLst>
           </a:blip>
@@ -8297,7 +8384,7 @@
           <p:cNvPr id="4" name="Picture 3">
             <a:extLst>
               <a:ext uri="{FF2B5EF4-FFF2-40B4-BE49-F238E27FC236}">
-                <a16:creationId xmlns="" xmlns:a16="http://schemas.microsoft.com/office/drawing/2014/main" id="{08DD0372-F361-4655-AFE7-2855BB164970}"/>
+                <a16:creationId xmlns:a16="http://schemas.microsoft.com/office/drawing/2014/main" id="{08DD0372-F361-4655-AFE7-2855BB164970}"/>
               </a:ext>
             </a:extLst>
           </p:cNvPr>
@@ -8310,7 +8397,7 @@
           <a:blip r:embed="rId3" cstate="print">
             <a:extLst>
               <a:ext uri="{28A0092B-C50C-407E-A947-70E740481C1C}">
-                <a14:useLocalDpi xmlns="" xmlns:a14="http://schemas.microsoft.com/office/drawing/2010/main" val="0"/>
+                <a14:useLocalDpi xmlns:a14="http://schemas.microsoft.com/office/drawing/2010/main" val="0"/>
               </a:ext>
             </a:extLst>
           </a:blip>
@@ -8333,7 +8420,7 @@
           <p:cNvPr id="8" name="Picture 7">
             <a:extLst>
               <a:ext uri="{FF2B5EF4-FFF2-40B4-BE49-F238E27FC236}">
-                <a16:creationId xmlns="" xmlns:a16="http://schemas.microsoft.com/office/drawing/2014/main" id="{FA4961E7-DDCE-492B-9E32-EA4461B5A637}"/>
+                <a16:creationId xmlns:a16="http://schemas.microsoft.com/office/drawing/2014/main" id="{FA4961E7-DDCE-492B-9E32-EA4461B5A637}"/>
               </a:ext>
             </a:extLst>
           </p:cNvPr>
@@ -8346,7 +8433,7 @@
           <a:blip r:embed="rId4" cstate="print">
             <a:extLst>
               <a:ext uri="{28A0092B-C50C-407E-A947-70E740481C1C}">
-                <a14:useLocalDpi xmlns="" xmlns:a14="http://schemas.microsoft.com/office/drawing/2010/main" val="0"/>
+                <a14:useLocalDpi xmlns:a14="http://schemas.microsoft.com/office/drawing/2010/main" val="0"/>
               </a:ext>
             </a:extLst>
           </a:blip>
@@ -8369,7 +8456,7 @@
           <p:cNvPr id="10" name="Picture 9">
             <a:extLst>
               <a:ext uri="{FF2B5EF4-FFF2-40B4-BE49-F238E27FC236}">
-                <a16:creationId xmlns="" xmlns:a16="http://schemas.microsoft.com/office/drawing/2014/main" id="{597A64EE-AE78-46DC-B8C0-26A00BA2824B}"/>
+                <a16:creationId xmlns:a16="http://schemas.microsoft.com/office/drawing/2014/main" id="{597A64EE-AE78-46DC-B8C0-26A00BA2824B}"/>
               </a:ext>
             </a:extLst>
           </p:cNvPr>
@@ -8382,7 +8469,7 @@
           <a:blip r:embed="rId5" cstate="print">
             <a:extLst>
               <a:ext uri="{28A0092B-C50C-407E-A947-70E740481C1C}">
-                <a14:useLocalDpi xmlns="" xmlns:a14="http://schemas.microsoft.com/office/drawing/2010/main" val="0"/>
+                <a14:useLocalDpi xmlns:a14="http://schemas.microsoft.com/office/drawing/2010/main" val="0"/>
               </a:ext>
             </a:extLst>
           </a:blip>
@@ -8437,7 +8524,7 @@
           <p:cNvPr id="13" name="Straight Arrow Connector 12">
             <a:extLst>
               <a:ext uri="{FF2B5EF4-FFF2-40B4-BE49-F238E27FC236}">
-                <a16:creationId xmlns="" xmlns:a16="http://schemas.microsoft.com/office/drawing/2014/main" id="{516D49CA-B0F7-4E22-BD32-A5CDD1926868}"/>
+                <a16:creationId xmlns:a16="http://schemas.microsoft.com/office/drawing/2014/main" id="{516D49CA-B0F7-4E22-BD32-A5CDD1926868}"/>
               </a:ext>
             </a:extLst>
           </p:cNvPr>
@@ -8476,20 +8563,13 @@
     </p:spTree>
     <p:extLst>
       <p:ext uri="{BB962C8B-B14F-4D97-AF65-F5344CB8AC3E}">
-        <p14:creationId xmlns="" xmlns:p14="http://schemas.microsoft.com/office/powerpoint/2010/main" val="1935535134"/>
+        <p14:creationId xmlns:p14="http://schemas.microsoft.com/office/powerpoint/2010/main" val="1935535134"/>
       </p:ext>
     </p:extLst>
   </p:cSld>
   <p:clrMapOvr>
     <a:masterClrMapping/>
   </p:clrMapOvr>
-  <p:timing>
-    <p:tnLst>
-      <p:par>
-        <p:cTn id="1" dur="indefinite" restart="never" nodeType="tmRoot"/>
-      </p:par>
-    </p:tnLst>
-  </p:timing>
 </p:sld>
 </file>
 
@@ -8515,7 +8595,7 @@
           <p:cNvPr id="2" name="Title 1">
             <a:extLst>
               <a:ext uri="{FF2B5EF4-FFF2-40B4-BE49-F238E27FC236}">
-                <a16:creationId xmlns="" xmlns:a16="http://schemas.microsoft.com/office/drawing/2014/main" id="{22185D28-3B81-4B35-B6F7-3DCAF5E34A9E}"/>
+                <a16:creationId xmlns:a16="http://schemas.microsoft.com/office/drawing/2014/main" id="{22185D28-3B81-4B35-B6F7-3DCAF5E34A9E}"/>
               </a:ext>
             </a:extLst>
           </p:cNvPr>
@@ -8536,31 +8616,6 @@
               <a:rPr lang="en-GB" dirty="0"/>
               <a:t>The Gameplay</a:t>
             </a:r>
-          </a:p>
-        </p:txBody>
-      </p:sp>
-      <p:sp>
-        <p:nvSpPr>
-          <p:cNvPr id="3" name="Content Placeholder 2">
-            <a:extLst>
-              <a:ext uri="{FF2B5EF4-FFF2-40B4-BE49-F238E27FC236}">
-                <a16:creationId xmlns="" xmlns:a16="http://schemas.microsoft.com/office/drawing/2014/main" id="{7AC224F6-28B1-4A42-864A-2ED9DA883E13}"/>
-              </a:ext>
-            </a:extLst>
-          </p:cNvPr>
-          <p:cNvSpPr>
-            <a:spLocks noGrp="1"/>
-          </p:cNvSpPr>
-          <p:nvPr>
-            <p:ph idx="1"/>
-          </p:nvPr>
-        </p:nvSpPr>
-        <p:spPr/>
-        <p:txBody>
-          <a:bodyPr/>
-          <a:lstStyle/>
-          <a:p>
-            <a:endParaRPr lang="en-GB" dirty="0"/>
           </a:p>
         </p:txBody>
       </p:sp>
@@ -8569,7 +8624,7 @@
           <p:cNvPr id="4" name="Picture 3">
             <a:extLst>
               <a:ext uri="{FF2B5EF4-FFF2-40B4-BE49-F238E27FC236}">
-                <a16:creationId xmlns="" xmlns:a16="http://schemas.microsoft.com/office/drawing/2014/main" id="{8A06DB27-579B-48E2-ACEB-09CAC9579B5E}"/>
+                <a16:creationId xmlns:a16="http://schemas.microsoft.com/office/drawing/2014/main" id="{8A06DB27-579B-48E2-ACEB-09CAC9579B5E}"/>
               </a:ext>
             </a:extLst>
           </p:cNvPr>
@@ -8582,7 +8637,7 @@
           <a:blip r:embed="rId3" cstate="print">
             <a:extLst>
               <a:ext uri="{28A0092B-C50C-407E-A947-70E740481C1C}">
-                <a14:useLocalDpi xmlns="" xmlns:a14="http://schemas.microsoft.com/office/drawing/2010/main" val="0"/>
+                <a14:useLocalDpi xmlns:a14="http://schemas.microsoft.com/office/drawing/2010/main" val="0"/>
               </a:ext>
             </a:extLst>
           </a:blip>
@@ -8628,10 +8683,50 @@
           </a:prstGeom>
         </p:spPr>
       </p:pic>
+      <p:sp>
+        <p:nvSpPr>
+          <p:cNvPr id="3" name="Content Placeholder 2">
+            <a:extLst>
+              <a:ext uri="{FF2B5EF4-FFF2-40B4-BE49-F238E27FC236}">
+                <a16:creationId xmlns:a16="http://schemas.microsoft.com/office/drawing/2014/main" id="{7AC224F6-28B1-4A42-864A-2ED9DA883E13}"/>
+              </a:ext>
+            </a:extLst>
+          </p:cNvPr>
+          <p:cNvSpPr>
+            <a:spLocks noGrp="1"/>
+          </p:cNvSpPr>
+          <p:nvPr>
+            <p:ph idx="1"/>
+          </p:nvPr>
+        </p:nvSpPr>
+        <p:spPr>
+          <a:xfrm>
+            <a:off x="1602557" y="3489343"/>
+            <a:ext cx="9235654" cy="4351338"/>
+          </a:xfrm>
+        </p:spPr>
+        <p:txBody>
+          <a:bodyPr>
+            <a:normAutofit/>
+          </a:bodyPr>
+          <a:lstStyle/>
+          <a:p>
+            <a:pPr algn="ctr"/>
+            <a:r>
+              <a:rPr lang="en-GB" sz="4000" b="1" u="sng" dirty="0">
+                <a:solidFill>
+                  <a:schemeClr val="bg1"/>
+                </a:solidFill>
+              </a:rPr>
+              <a:t>EMBED A YOUTUBE LINK OR SOMETHING, OTHERWISE VIDEO HAS TO BE ON THE MACHINE!!!</a:t>
+            </a:r>
+          </a:p>
+        </p:txBody>
+      </p:sp>
     </p:spTree>
     <p:extLst>
       <p:ext uri="{BB962C8B-B14F-4D97-AF65-F5344CB8AC3E}">
-        <p14:creationId xmlns="" xmlns:p14="http://schemas.microsoft.com/office/powerpoint/2010/main" val="1929326837"/>
+        <p14:creationId xmlns:p14="http://schemas.microsoft.com/office/powerpoint/2010/main" val="1929326837"/>
       </p:ext>
     </p:extLst>
   </p:cSld>
@@ -8813,7 +8908,7 @@
           <p:cNvPr id="2" name="Title 1">
             <a:extLst>
               <a:ext uri="{FF2B5EF4-FFF2-40B4-BE49-F238E27FC236}">
-                <a16:creationId xmlns="" xmlns:a16="http://schemas.microsoft.com/office/drawing/2014/main" id="{BE75E444-1504-4EB6-99F0-27C062A2514B}"/>
+                <a16:creationId xmlns:a16="http://schemas.microsoft.com/office/drawing/2014/main" id="{BE75E444-1504-4EB6-99F0-27C062A2514B}"/>
               </a:ext>
             </a:extLst>
           </p:cNvPr>
@@ -8842,7 +8937,7 @@
           <p:cNvPr id="3" name="Content Placeholder 2">
             <a:extLst>
               <a:ext uri="{FF2B5EF4-FFF2-40B4-BE49-F238E27FC236}">
-                <a16:creationId xmlns="" xmlns:a16="http://schemas.microsoft.com/office/drawing/2014/main" id="{B9C2A57B-51BB-44D6-A6D0-2EF8F6F37310}"/>
+                <a16:creationId xmlns:a16="http://schemas.microsoft.com/office/drawing/2014/main" id="{B9C2A57B-51BB-44D6-A6D0-2EF8F6F37310}"/>
               </a:ext>
             </a:extLst>
           </p:cNvPr>
@@ -8859,40 +8954,39 @@
           <a:lstStyle/>
           <a:p>
             <a:r>
-              <a:rPr lang="en-GB" dirty="0" smtClean="0"/>
+              <a:rPr lang="en-GB" dirty="0"/>
               <a:t>Enjoyed the multiplayer</a:t>
             </a:r>
           </a:p>
           <a:p>
             <a:r>
-              <a:rPr lang="en-GB" dirty="0" smtClean="0"/>
+              <a:rPr lang="en-GB" dirty="0"/>
               <a:t>The grappling mechanics were fun to use</a:t>
             </a:r>
           </a:p>
           <a:p>
             <a:r>
-              <a:rPr lang="en-GB" dirty="0" smtClean="0"/>
+              <a:rPr lang="en-GB" dirty="0"/>
               <a:t>“I had no idea where to go”</a:t>
             </a:r>
           </a:p>
           <a:p>
             <a:r>
-              <a:rPr lang="en-GB" dirty="0" smtClean="0"/>
+              <a:rPr lang="en-GB" dirty="0"/>
               <a:t>There is little guidence for the player</a:t>
             </a:r>
           </a:p>
           <a:p>
             <a:r>
-              <a:rPr lang="en-GB" dirty="0" smtClean="0"/>
+              <a:rPr lang="en-GB" dirty="0"/>
               <a:t>Hard to scale some of the buildings</a:t>
             </a:r>
           </a:p>
           <a:p>
             <a:r>
-              <a:rPr lang="en-GB" dirty="0" smtClean="0"/>
-              <a:t>Couldnt see the grapple cooldown timer</a:t>
-            </a:r>
-            <a:endParaRPr lang="en-GB" dirty="0"/>
+              <a:rPr lang="en-GB" dirty="0"/>
+              <a:t>Couldn’t see the grapple cooldown timer</a:t>
+            </a:r>
           </a:p>
         </p:txBody>
       </p:sp>
@@ -8901,7 +8995,7 @@
           <p:cNvPr id="4" name="Picture 3">
             <a:extLst>
               <a:ext uri="{FF2B5EF4-FFF2-40B4-BE49-F238E27FC236}">
-                <a16:creationId xmlns="" xmlns:a16="http://schemas.microsoft.com/office/drawing/2014/main" id="{1B9EA258-D179-4AF5-91C9-08A033D12895}"/>
+                <a16:creationId xmlns:a16="http://schemas.microsoft.com/office/drawing/2014/main" id="{1B9EA258-D179-4AF5-91C9-08A033D12895}"/>
               </a:ext>
             </a:extLst>
           </p:cNvPr>
@@ -8914,7 +9008,7 @@
           <a:blip r:embed="rId2" cstate="print">
             <a:extLst>
               <a:ext uri="{28A0092B-C50C-407E-A947-70E740481C1C}">
-                <a14:useLocalDpi xmlns="" xmlns:a14="http://schemas.microsoft.com/office/drawing/2010/main" val="0"/>
+                <a14:useLocalDpi xmlns:a14="http://schemas.microsoft.com/office/drawing/2010/main" val="0"/>
               </a:ext>
             </a:extLst>
           </a:blip>
@@ -8935,20 +9029,13 @@
     </p:spTree>
     <p:extLst>
       <p:ext uri="{BB962C8B-B14F-4D97-AF65-F5344CB8AC3E}">
-        <p14:creationId xmlns="" xmlns:p14="http://schemas.microsoft.com/office/powerpoint/2010/main" val="3985286661"/>
+        <p14:creationId xmlns:p14="http://schemas.microsoft.com/office/powerpoint/2010/main" val="3985286661"/>
       </p:ext>
     </p:extLst>
   </p:cSld>
   <p:clrMapOvr>
     <a:masterClrMapping/>
   </p:clrMapOvr>
-  <p:timing>
-    <p:tnLst>
-      <p:par>
-        <p:cTn id="1" dur="indefinite" restart="never" nodeType="tmRoot"/>
-      </p:par>
-    </p:tnLst>
-  </p:timing>
 </p:sld>
 </file>
 
@@ -8974,7 +9061,7 @@
           <p:cNvPr id="2" name="Title 1">
             <a:extLst>
               <a:ext uri="{FF2B5EF4-FFF2-40B4-BE49-F238E27FC236}">
-                <a16:creationId xmlns="" xmlns:a16="http://schemas.microsoft.com/office/drawing/2014/main" id="{804D6BEF-CAC3-4E5F-94C1-42D03EF78D17}"/>
+                <a16:creationId xmlns:a16="http://schemas.microsoft.com/office/drawing/2014/main" id="{804D6BEF-CAC3-4E5F-94C1-42D03EF78D17}"/>
               </a:ext>
             </a:extLst>
           </p:cNvPr>
@@ -9003,7 +9090,7 @@
           <p:cNvPr id="3" name="Content Placeholder 2">
             <a:extLst>
               <a:ext uri="{FF2B5EF4-FFF2-40B4-BE49-F238E27FC236}">
-                <a16:creationId xmlns="" xmlns:a16="http://schemas.microsoft.com/office/drawing/2014/main" id="{4E56754D-69A4-432A-A381-04F413EB7E26}"/>
+                <a16:creationId xmlns:a16="http://schemas.microsoft.com/office/drawing/2014/main" id="{4E56754D-69A4-432A-A381-04F413EB7E26}"/>
               </a:ext>
             </a:extLst>
           </p:cNvPr>
@@ -9049,7 +9136,7 @@
           <p:cNvPr id="4" name="Picture 3">
             <a:extLst>
               <a:ext uri="{FF2B5EF4-FFF2-40B4-BE49-F238E27FC236}">
-                <a16:creationId xmlns="" xmlns:a16="http://schemas.microsoft.com/office/drawing/2014/main" id="{CE8F705F-E7A0-4D58-949D-E7A614792454}"/>
+                <a16:creationId xmlns:a16="http://schemas.microsoft.com/office/drawing/2014/main" id="{CE8F705F-E7A0-4D58-949D-E7A614792454}"/>
               </a:ext>
             </a:extLst>
           </p:cNvPr>
@@ -9062,7 +9149,7 @@
           <a:blip r:embed="rId2" cstate="print">
             <a:extLst>
               <a:ext uri="{28A0092B-C50C-407E-A947-70E740481C1C}">
-                <a14:useLocalDpi xmlns="" xmlns:a14="http://schemas.microsoft.com/office/drawing/2010/main" val="0"/>
+                <a14:useLocalDpi xmlns:a14="http://schemas.microsoft.com/office/drawing/2010/main" val="0"/>
               </a:ext>
             </a:extLst>
           </a:blip>
@@ -9085,7 +9172,7 @@
           <p:cNvPr id="7" name="Content Placeholder 2">
             <a:extLst>
               <a:ext uri="{FF2B5EF4-FFF2-40B4-BE49-F238E27FC236}">
-                <a16:creationId xmlns="" xmlns:a16="http://schemas.microsoft.com/office/drawing/2014/main" id="{041F66B2-4920-4C66-9023-DAB1E5D25A69}"/>
+                <a16:creationId xmlns:a16="http://schemas.microsoft.com/office/drawing/2014/main" id="{041F66B2-4920-4C66-9023-DAB1E5D25A69}"/>
               </a:ext>
             </a:extLst>
           </p:cNvPr>
@@ -9096,8 +9183,8 @@
         </p:nvSpPr>
         <p:spPr>
           <a:xfrm>
-            <a:off x="1120000" y="2963595"/>
-            <a:ext cx="10233800" cy="1003033"/>
+            <a:off x="1120000" y="2828658"/>
+            <a:ext cx="10233800" cy="1665521"/>
           </a:xfrm>
           <a:prstGeom prst="rect">
             <a:avLst/>
@@ -9378,25 +9465,27 @@
               <a:t>Further playtesting</a:t>
             </a:r>
           </a:p>
+          <a:p>
+            <a:r>
+              <a:rPr lang="en-GB" dirty="0"/>
+              <a:t>Player character texturing / animations</a:t>
+            </a:r>
+          </a:p>
+          <a:p>
+            <a:endParaRPr lang="en-GB" dirty="0"/>
+          </a:p>
         </p:txBody>
       </p:sp>
     </p:spTree>
     <p:extLst>
       <p:ext uri="{BB962C8B-B14F-4D97-AF65-F5344CB8AC3E}">
-        <p14:creationId xmlns="" xmlns:p14="http://schemas.microsoft.com/office/powerpoint/2010/main" val="1980736762"/>
+        <p14:creationId xmlns:p14="http://schemas.microsoft.com/office/powerpoint/2010/main" val="1980736762"/>
       </p:ext>
     </p:extLst>
   </p:cSld>
   <p:clrMapOvr>
     <a:masterClrMapping/>
   </p:clrMapOvr>
-  <p:timing>
-    <p:tnLst>
-      <p:par>
-        <p:cTn id="1" dur="indefinite" restart="never" nodeType="tmRoot"/>
-      </p:par>
-    </p:tnLst>
-  </p:timing>
 </p:sld>
 </file>
 
@@ -9655,7 +9744,7 @@
   <a:extraClrSchemeLst/>
   <a:extLst>
     <a:ext uri="{05A4C25C-085E-4340-85A3-A5531E510DB2}">
-      <thm15:themeFamily xmlns="" xmlns:thm15="http://schemas.microsoft.com/office/thememl/2012/main" name="Depth" id="{7BEAFC2A-325C-49C4-AC08-2B765DA903F9}" vid="{1735E755-43E6-43AA-ABA2-C989ECC79AF5}"/>
+      <thm15:themeFamily xmlns:thm15="http://schemas.microsoft.com/office/thememl/2012/main" name="Depth" id="{7BEAFC2A-325C-49C4-AC08-2B765DA903F9}" vid="{1735E755-43E6-43AA-ABA2-C989ECC79AF5}"/>
     </a:ext>
   </a:extLst>
 </a:theme>
@@ -9950,7 +10039,7 @@
   <a:extraClrSchemeLst/>
   <a:extLst>
     <a:ext uri="{05A4C25C-085E-4340-85A3-A5531E510DB2}">
-      <thm15:themeFamily xmlns="" xmlns:thm15="http://schemas.microsoft.com/office/thememl/2012/main" name="Office Theme" id="{62F939B6-93AF-4DB8-9C6B-D6C7DFDC589F}" vid="{4A3C46E8-61CC-4603-A589-7422A47A8E4A}"/>
+      <thm15:themeFamily xmlns:thm15="http://schemas.microsoft.com/office/thememl/2012/main" name="Office Theme" id="{62F939B6-93AF-4DB8-9C6B-D6C7DFDC589F}" vid="{4A3C46E8-61CC-4603-A589-7422A47A8E4A}"/>
     </a:ext>
   </a:extLst>
 </a:theme>

</xml_diff>

<commit_message>
Added Youtube Embed Link
Added a youtube link for the test vid should we need it.
</commit_message>
<xml_diff>
--- a/Group/Presentations/Pitch #2 (New).pptx
+++ b/Group/Presentations/Pitch #2 (New).pptx
@@ -8701,8 +8701,8 @@
         </p:nvSpPr>
         <p:spPr>
           <a:xfrm>
-            <a:off x="1602557" y="3489343"/>
-            <a:ext cx="9235654" cy="4351338"/>
+            <a:off x="4209570" y="162001"/>
+            <a:ext cx="7785473" cy="324382"/>
           </a:xfrm>
         </p:spPr>
         <p:txBody>
@@ -8713,12 +8713,12 @@
           <a:p>
             <a:pPr algn="ctr"/>
             <a:r>
-              <a:rPr lang="en-GB" sz="4000" b="1" u="sng" dirty="0">
+              <a:rPr lang="en-GB" sz="1600" b="1" u="sng" dirty="0">
                 <a:solidFill>
                   <a:schemeClr val="bg1"/>
                 </a:solidFill>
               </a:rPr>
-              <a:t>EMBED A YOUTUBE LINK OR SOMETHING, OTHERWISE VIDEO HAS TO BE ON THE MACHINE!!!</a:t>
+              <a:t>https://www.youtube.com/watch?v=jQAUHddXAp0&amp;feature=youtu.be</a:t>
             </a:r>
           </a:p>
         </p:txBody>

</xml_diff>